<commit_message>
so annoying youtube :(
</commit_message>
<xml_diff>
--- a/inst/thumbnails and templates/scoring_and_ranking.pptx
+++ b/inst/thumbnails and templates/scoring_and_ranking.pptx
@@ -4,9 +4,18 @@
   <p:sldMasterIdLst>
     <p:sldMasterId id="2147483648" r:id="rId1"/>
   </p:sldMasterIdLst>
+  <p:notesMasterIdLst>
+    <p:notesMasterId r:id="rId10"/>
+  </p:notesMasterIdLst>
   <p:sldIdLst>
     <p:sldId id="256" r:id="rId2"/>
     <p:sldId id="257" r:id="rId3"/>
+    <p:sldId id="258" r:id="rId4"/>
+    <p:sldId id="259" r:id="rId5"/>
+    <p:sldId id="260" r:id="rId6"/>
+    <p:sldId id="261" r:id="rId7"/>
+    <p:sldId id="262" r:id="rId8"/>
+    <p:sldId id="263" r:id="rId9"/>
   </p:sldIdLst>
   <p:sldSz cx="12192000" cy="6858000"/>
   <p:notesSz cx="6858000" cy="9144000"/>
@@ -113,6 +122,943 @@
 </p:presentation>
 </file>
 
+<file path=ppt/notesMasters/notesMaster1.xml><?xml version="1.0" encoding="utf-8"?>
+<p:notesMaster xmlns:a="http://schemas.openxmlformats.org/drawingml/2006/main" xmlns:r="http://schemas.openxmlformats.org/officeDocument/2006/relationships" xmlns:p="http://schemas.openxmlformats.org/presentationml/2006/main">
+  <p:cSld>
+    <p:bg>
+      <p:bgRef idx="1001">
+        <a:schemeClr val="bg1"/>
+      </p:bgRef>
+    </p:bg>
+    <p:spTree>
+      <p:nvGrpSpPr>
+        <p:cNvPr id="1" name=""/>
+        <p:cNvGrpSpPr/>
+        <p:nvPr/>
+      </p:nvGrpSpPr>
+      <p:grpSpPr>
+        <a:xfrm>
+          <a:off x="0" y="0"/>
+          <a:ext cx="0" cy="0"/>
+          <a:chOff x="0" y="0"/>
+          <a:chExt cx="0" cy="0"/>
+        </a:xfrm>
+      </p:grpSpPr>
+      <p:sp>
+        <p:nvSpPr>
+          <p:cNvPr id="2" name="Header Placeholder 1"/>
+          <p:cNvSpPr>
+            <a:spLocks noGrp="1"/>
+          </p:cNvSpPr>
+          <p:nvPr>
+            <p:ph type="hdr" sz="quarter"/>
+          </p:nvPr>
+        </p:nvSpPr>
+        <p:spPr>
+          <a:xfrm>
+            <a:off x="0" y="0"/>
+            <a:ext cx="2971800" cy="458788"/>
+          </a:xfrm>
+          <a:prstGeom prst="rect">
+            <a:avLst/>
+          </a:prstGeom>
+        </p:spPr>
+        <p:txBody>
+          <a:bodyPr vert="horz" lIns="91440" tIns="45720" rIns="91440" bIns="45720" rtlCol="0"/>
+          <a:lstStyle>
+            <a:lvl1pPr algn="l">
+              <a:defRPr sz="1200"/>
+            </a:lvl1pPr>
+          </a:lstStyle>
+          <a:p>
+            <a:endParaRPr lang="en-US"/>
+          </a:p>
+        </p:txBody>
+      </p:sp>
+      <p:sp>
+        <p:nvSpPr>
+          <p:cNvPr id="3" name="Date Placeholder 2"/>
+          <p:cNvSpPr>
+            <a:spLocks noGrp="1"/>
+          </p:cNvSpPr>
+          <p:nvPr>
+            <p:ph type="dt" idx="1"/>
+          </p:nvPr>
+        </p:nvSpPr>
+        <p:spPr>
+          <a:xfrm>
+            <a:off x="3884613" y="0"/>
+            <a:ext cx="2971800" cy="458788"/>
+          </a:xfrm>
+          <a:prstGeom prst="rect">
+            <a:avLst/>
+          </a:prstGeom>
+        </p:spPr>
+        <p:txBody>
+          <a:bodyPr vert="horz" lIns="91440" tIns="45720" rIns="91440" bIns="45720" rtlCol="0"/>
+          <a:lstStyle>
+            <a:lvl1pPr algn="r">
+              <a:defRPr sz="1200"/>
+            </a:lvl1pPr>
+          </a:lstStyle>
+          <a:p>
+            <a:fld id="{213B5D67-68D1-44BC-B751-4F5BE9375BDD}" type="datetimeFigureOut">
+              <a:rPr lang="en-US" smtClean="0"/>
+              <a:t>9/11/2023</a:t>
+            </a:fld>
+            <a:endParaRPr lang="en-US"/>
+          </a:p>
+        </p:txBody>
+      </p:sp>
+      <p:sp>
+        <p:nvSpPr>
+          <p:cNvPr id="4" name="Slide Image Placeholder 3"/>
+          <p:cNvSpPr>
+            <a:spLocks noGrp="1" noRot="1" noChangeAspect="1"/>
+          </p:cNvSpPr>
+          <p:nvPr>
+            <p:ph type="sldImg" idx="2"/>
+          </p:nvPr>
+        </p:nvSpPr>
+        <p:spPr>
+          <a:xfrm>
+            <a:off x="685800" y="1143000"/>
+            <a:ext cx="5486400" cy="3086100"/>
+          </a:xfrm>
+          <a:prstGeom prst="rect">
+            <a:avLst/>
+          </a:prstGeom>
+          <a:noFill/>
+          <a:ln w="12700">
+            <a:solidFill>
+              <a:prstClr val="black"/>
+            </a:solidFill>
+          </a:ln>
+        </p:spPr>
+        <p:txBody>
+          <a:bodyPr vert="horz" lIns="91440" tIns="45720" rIns="91440" bIns="45720" rtlCol="0" anchor="ctr"/>
+          <a:lstStyle/>
+          <a:p>
+            <a:endParaRPr lang="en-US"/>
+          </a:p>
+        </p:txBody>
+      </p:sp>
+      <p:sp>
+        <p:nvSpPr>
+          <p:cNvPr id="5" name="Notes Placeholder 4"/>
+          <p:cNvSpPr>
+            <a:spLocks noGrp="1"/>
+          </p:cNvSpPr>
+          <p:nvPr>
+            <p:ph type="body" sz="quarter" idx="3"/>
+          </p:nvPr>
+        </p:nvSpPr>
+        <p:spPr>
+          <a:xfrm>
+            <a:off x="685800" y="4400550"/>
+            <a:ext cx="5486400" cy="3600450"/>
+          </a:xfrm>
+          <a:prstGeom prst="rect">
+            <a:avLst/>
+          </a:prstGeom>
+        </p:spPr>
+        <p:txBody>
+          <a:bodyPr vert="horz" lIns="91440" tIns="45720" rIns="91440" bIns="45720" rtlCol="0"/>
+          <a:lstStyle/>
+          <a:p>
+            <a:pPr lvl="0"/>
+            <a:r>
+              <a:rPr lang="en-US"/>
+              <a:t>Click to edit Master text styles</a:t>
+            </a:r>
+          </a:p>
+          <a:p>
+            <a:pPr lvl="1"/>
+            <a:r>
+              <a:rPr lang="en-US"/>
+              <a:t>Second level</a:t>
+            </a:r>
+          </a:p>
+          <a:p>
+            <a:pPr lvl="2"/>
+            <a:r>
+              <a:rPr lang="en-US"/>
+              <a:t>Third level</a:t>
+            </a:r>
+          </a:p>
+          <a:p>
+            <a:pPr lvl="3"/>
+            <a:r>
+              <a:rPr lang="en-US"/>
+              <a:t>Fourth level</a:t>
+            </a:r>
+          </a:p>
+          <a:p>
+            <a:pPr lvl="4"/>
+            <a:r>
+              <a:rPr lang="en-US"/>
+              <a:t>Fifth level</a:t>
+            </a:r>
+          </a:p>
+        </p:txBody>
+      </p:sp>
+      <p:sp>
+        <p:nvSpPr>
+          <p:cNvPr id="6" name="Footer Placeholder 5"/>
+          <p:cNvSpPr>
+            <a:spLocks noGrp="1"/>
+          </p:cNvSpPr>
+          <p:nvPr>
+            <p:ph type="ftr" sz="quarter" idx="4"/>
+          </p:nvPr>
+        </p:nvSpPr>
+        <p:spPr>
+          <a:xfrm>
+            <a:off x="0" y="8685213"/>
+            <a:ext cx="2971800" cy="458787"/>
+          </a:xfrm>
+          <a:prstGeom prst="rect">
+            <a:avLst/>
+          </a:prstGeom>
+        </p:spPr>
+        <p:txBody>
+          <a:bodyPr vert="horz" lIns="91440" tIns="45720" rIns="91440" bIns="45720" rtlCol="0" anchor="b"/>
+          <a:lstStyle>
+            <a:lvl1pPr algn="l">
+              <a:defRPr sz="1200"/>
+            </a:lvl1pPr>
+          </a:lstStyle>
+          <a:p>
+            <a:endParaRPr lang="en-US"/>
+          </a:p>
+        </p:txBody>
+      </p:sp>
+      <p:sp>
+        <p:nvSpPr>
+          <p:cNvPr id="7" name="Slide Number Placeholder 6"/>
+          <p:cNvSpPr>
+            <a:spLocks noGrp="1"/>
+          </p:cNvSpPr>
+          <p:nvPr>
+            <p:ph type="sldNum" sz="quarter" idx="5"/>
+          </p:nvPr>
+        </p:nvSpPr>
+        <p:spPr>
+          <a:xfrm>
+            <a:off x="3884613" y="8685213"/>
+            <a:ext cx="2971800" cy="458787"/>
+          </a:xfrm>
+          <a:prstGeom prst="rect">
+            <a:avLst/>
+          </a:prstGeom>
+        </p:spPr>
+        <p:txBody>
+          <a:bodyPr vert="horz" lIns="91440" tIns="45720" rIns="91440" bIns="45720" rtlCol="0" anchor="b"/>
+          <a:lstStyle>
+            <a:lvl1pPr algn="r">
+              <a:defRPr sz="1200"/>
+            </a:lvl1pPr>
+          </a:lstStyle>
+          <a:p>
+            <a:fld id="{C4DA8FDE-563B-4000-AD6C-C5B0ED2E1BBF}" type="slidenum">
+              <a:rPr lang="en-US" smtClean="0"/>
+              <a:t>‹#›</a:t>
+            </a:fld>
+            <a:endParaRPr lang="en-US"/>
+          </a:p>
+        </p:txBody>
+      </p:sp>
+    </p:spTree>
+    <p:extLst>
+      <p:ext uri="{BB962C8B-B14F-4D97-AF65-F5344CB8AC3E}">
+        <p14:creationId xmlns:p14="http://schemas.microsoft.com/office/powerpoint/2010/main" val="3448127516"/>
+      </p:ext>
+    </p:extLst>
+  </p:cSld>
+  <p:clrMap bg1="lt1" tx1="dk1" bg2="lt2" tx2="dk2" accent1="accent1" accent2="accent2" accent3="accent3" accent4="accent4" accent5="accent5" accent6="accent6" hlink="hlink" folHlink="folHlink"/>
+  <p:notesStyle>
+    <a:lvl1pPr marL="0" algn="l" defTabSz="914400" rtl="0" eaLnBrk="1" latinLnBrk="0" hangingPunct="1">
+      <a:defRPr sz="1200" kern="1200">
+        <a:solidFill>
+          <a:schemeClr val="tx1"/>
+        </a:solidFill>
+        <a:latin typeface="+mn-lt"/>
+        <a:ea typeface="+mn-ea"/>
+        <a:cs typeface="+mn-cs"/>
+      </a:defRPr>
+    </a:lvl1pPr>
+    <a:lvl2pPr marL="457200" algn="l" defTabSz="914400" rtl="0" eaLnBrk="1" latinLnBrk="0" hangingPunct="1">
+      <a:defRPr sz="1200" kern="1200">
+        <a:solidFill>
+          <a:schemeClr val="tx1"/>
+        </a:solidFill>
+        <a:latin typeface="+mn-lt"/>
+        <a:ea typeface="+mn-ea"/>
+        <a:cs typeface="+mn-cs"/>
+      </a:defRPr>
+    </a:lvl2pPr>
+    <a:lvl3pPr marL="914400" algn="l" defTabSz="914400" rtl="0" eaLnBrk="1" latinLnBrk="0" hangingPunct="1">
+      <a:defRPr sz="1200" kern="1200">
+        <a:solidFill>
+          <a:schemeClr val="tx1"/>
+        </a:solidFill>
+        <a:latin typeface="+mn-lt"/>
+        <a:ea typeface="+mn-ea"/>
+        <a:cs typeface="+mn-cs"/>
+      </a:defRPr>
+    </a:lvl3pPr>
+    <a:lvl4pPr marL="1371600" algn="l" defTabSz="914400" rtl="0" eaLnBrk="1" latinLnBrk="0" hangingPunct="1">
+      <a:defRPr sz="1200" kern="1200">
+        <a:solidFill>
+          <a:schemeClr val="tx1"/>
+        </a:solidFill>
+        <a:latin typeface="+mn-lt"/>
+        <a:ea typeface="+mn-ea"/>
+        <a:cs typeface="+mn-cs"/>
+      </a:defRPr>
+    </a:lvl4pPr>
+    <a:lvl5pPr marL="1828800" algn="l" defTabSz="914400" rtl="0" eaLnBrk="1" latinLnBrk="0" hangingPunct="1">
+      <a:defRPr sz="1200" kern="1200">
+        <a:solidFill>
+          <a:schemeClr val="tx1"/>
+        </a:solidFill>
+        <a:latin typeface="+mn-lt"/>
+        <a:ea typeface="+mn-ea"/>
+        <a:cs typeface="+mn-cs"/>
+      </a:defRPr>
+    </a:lvl5pPr>
+    <a:lvl6pPr marL="2286000" algn="l" defTabSz="914400" rtl="0" eaLnBrk="1" latinLnBrk="0" hangingPunct="1">
+      <a:defRPr sz="1200" kern="1200">
+        <a:solidFill>
+          <a:schemeClr val="tx1"/>
+        </a:solidFill>
+        <a:latin typeface="+mn-lt"/>
+        <a:ea typeface="+mn-ea"/>
+        <a:cs typeface="+mn-cs"/>
+      </a:defRPr>
+    </a:lvl6pPr>
+    <a:lvl7pPr marL="2743200" algn="l" defTabSz="914400" rtl="0" eaLnBrk="1" latinLnBrk="0" hangingPunct="1">
+      <a:defRPr sz="1200" kern="1200">
+        <a:solidFill>
+          <a:schemeClr val="tx1"/>
+        </a:solidFill>
+        <a:latin typeface="+mn-lt"/>
+        <a:ea typeface="+mn-ea"/>
+        <a:cs typeface="+mn-cs"/>
+      </a:defRPr>
+    </a:lvl7pPr>
+    <a:lvl8pPr marL="3200400" algn="l" defTabSz="914400" rtl="0" eaLnBrk="1" latinLnBrk="0" hangingPunct="1">
+      <a:defRPr sz="1200" kern="1200">
+        <a:solidFill>
+          <a:schemeClr val="tx1"/>
+        </a:solidFill>
+        <a:latin typeface="+mn-lt"/>
+        <a:ea typeface="+mn-ea"/>
+        <a:cs typeface="+mn-cs"/>
+      </a:defRPr>
+    </a:lvl8pPr>
+    <a:lvl9pPr marL="3657600" algn="l" defTabSz="914400" rtl="0" eaLnBrk="1" latinLnBrk="0" hangingPunct="1">
+      <a:defRPr sz="1200" kern="1200">
+        <a:solidFill>
+          <a:schemeClr val="tx1"/>
+        </a:solidFill>
+        <a:latin typeface="+mn-lt"/>
+        <a:ea typeface="+mn-ea"/>
+        <a:cs typeface="+mn-cs"/>
+      </a:defRPr>
+    </a:lvl9pPr>
+  </p:notesStyle>
+</p:notesMaster>
+</file>
+
+<file path=ppt/notesSlides/notesSlide1.xml><?xml version="1.0" encoding="utf-8"?>
+<p:notes xmlns:a="http://schemas.openxmlformats.org/drawingml/2006/main" xmlns:r="http://schemas.openxmlformats.org/officeDocument/2006/relationships" xmlns:p="http://schemas.openxmlformats.org/presentationml/2006/main">
+  <p:cSld>
+    <p:spTree>
+      <p:nvGrpSpPr>
+        <p:cNvPr id="1" name=""/>
+        <p:cNvGrpSpPr/>
+        <p:nvPr/>
+      </p:nvGrpSpPr>
+      <p:grpSpPr>
+        <a:xfrm>
+          <a:off x="0" y="0"/>
+          <a:ext cx="0" cy="0"/>
+          <a:chOff x="0" y="0"/>
+          <a:chExt cx="0" cy="0"/>
+        </a:xfrm>
+      </p:grpSpPr>
+      <p:sp>
+        <p:nvSpPr>
+          <p:cNvPr id="2" name="Slide Image Placeholder 1"/>
+          <p:cNvSpPr>
+            <a:spLocks noGrp="1" noRot="1" noChangeAspect="1"/>
+          </p:cNvSpPr>
+          <p:nvPr>
+            <p:ph type="sldImg"/>
+          </p:nvPr>
+        </p:nvSpPr>
+        <p:spPr/>
+      </p:sp>
+      <p:sp>
+        <p:nvSpPr>
+          <p:cNvPr id="3" name="Notes Placeholder 2"/>
+          <p:cNvSpPr>
+            <a:spLocks noGrp="1"/>
+          </p:cNvSpPr>
+          <p:nvPr>
+            <p:ph type="body" idx="1"/>
+          </p:nvPr>
+        </p:nvSpPr>
+        <p:spPr/>
+        <p:txBody>
+          <a:bodyPr/>
+          <a:lstStyle/>
+          <a:p>
+            <a:endParaRPr lang="en-US"/>
+          </a:p>
+        </p:txBody>
+      </p:sp>
+      <p:sp>
+        <p:nvSpPr>
+          <p:cNvPr id="4" name="Slide Number Placeholder 3"/>
+          <p:cNvSpPr>
+            <a:spLocks noGrp="1"/>
+          </p:cNvSpPr>
+          <p:nvPr>
+            <p:ph type="sldNum" sz="quarter" idx="5"/>
+          </p:nvPr>
+        </p:nvSpPr>
+        <p:spPr/>
+        <p:txBody>
+          <a:bodyPr/>
+          <a:lstStyle/>
+          <a:p>
+            <a:fld id="{C4DA8FDE-563B-4000-AD6C-C5B0ED2E1BBF}" type="slidenum">
+              <a:rPr lang="en-US" smtClean="0"/>
+              <a:t>2</a:t>
+            </a:fld>
+            <a:endParaRPr lang="en-US"/>
+          </a:p>
+        </p:txBody>
+      </p:sp>
+    </p:spTree>
+    <p:extLst>
+      <p:ext uri="{BB962C8B-B14F-4D97-AF65-F5344CB8AC3E}">
+        <p14:creationId xmlns:p14="http://schemas.microsoft.com/office/powerpoint/2010/main" val="4233034608"/>
+      </p:ext>
+    </p:extLst>
+  </p:cSld>
+  <p:clrMapOvr>
+    <a:masterClrMapping/>
+  </p:clrMapOvr>
+</p:notes>
+</file>
+
+<file path=ppt/notesSlides/notesSlide2.xml><?xml version="1.0" encoding="utf-8"?>
+<p:notes xmlns:a="http://schemas.openxmlformats.org/drawingml/2006/main" xmlns:r="http://schemas.openxmlformats.org/officeDocument/2006/relationships" xmlns:p="http://schemas.openxmlformats.org/presentationml/2006/main">
+  <p:cSld>
+    <p:spTree>
+      <p:nvGrpSpPr>
+        <p:cNvPr id="1" name=""/>
+        <p:cNvGrpSpPr/>
+        <p:nvPr/>
+      </p:nvGrpSpPr>
+      <p:grpSpPr>
+        <a:xfrm>
+          <a:off x="0" y="0"/>
+          <a:ext cx="0" cy="0"/>
+          <a:chOff x="0" y="0"/>
+          <a:chExt cx="0" cy="0"/>
+        </a:xfrm>
+      </p:grpSpPr>
+      <p:sp>
+        <p:nvSpPr>
+          <p:cNvPr id="2" name="Slide Image Placeholder 1"/>
+          <p:cNvSpPr>
+            <a:spLocks noGrp="1" noRot="1" noChangeAspect="1"/>
+          </p:cNvSpPr>
+          <p:nvPr>
+            <p:ph type="sldImg"/>
+          </p:nvPr>
+        </p:nvSpPr>
+        <p:spPr/>
+      </p:sp>
+      <p:sp>
+        <p:nvSpPr>
+          <p:cNvPr id="3" name="Notes Placeholder 2"/>
+          <p:cNvSpPr>
+            <a:spLocks noGrp="1"/>
+          </p:cNvSpPr>
+          <p:nvPr>
+            <p:ph type="body" idx="1"/>
+          </p:nvPr>
+        </p:nvSpPr>
+        <p:spPr/>
+        <p:txBody>
+          <a:bodyPr/>
+          <a:lstStyle/>
+          <a:p>
+            <a:endParaRPr lang="en-US"/>
+          </a:p>
+        </p:txBody>
+      </p:sp>
+      <p:sp>
+        <p:nvSpPr>
+          <p:cNvPr id="4" name="Slide Number Placeholder 3"/>
+          <p:cNvSpPr>
+            <a:spLocks noGrp="1"/>
+          </p:cNvSpPr>
+          <p:nvPr>
+            <p:ph type="sldNum" sz="quarter" idx="5"/>
+          </p:nvPr>
+        </p:nvSpPr>
+        <p:spPr/>
+        <p:txBody>
+          <a:bodyPr/>
+          <a:lstStyle/>
+          <a:p>
+            <a:fld id="{C4DA8FDE-563B-4000-AD6C-C5B0ED2E1BBF}" type="slidenum">
+              <a:rPr lang="en-US" smtClean="0"/>
+              <a:t>3</a:t>
+            </a:fld>
+            <a:endParaRPr lang="en-US"/>
+          </a:p>
+        </p:txBody>
+      </p:sp>
+    </p:spTree>
+    <p:extLst>
+      <p:ext uri="{BB962C8B-B14F-4D97-AF65-F5344CB8AC3E}">
+        <p14:creationId xmlns:p14="http://schemas.microsoft.com/office/powerpoint/2010/main" val="3011091748"/>
+      </p:ext>
+    </p:extLst>
+  </p:cSld>
+  <p:clrMapOvr>
+    <a:masterClrMapping/>
+  </p:clrMapOvr>
+</p:notes>
+</file>
+
+<file path=ppt/notesSlides/notesSlide3.xml><?xml version="1.0" encoding="utf-8"?>
+<p:notes xmlns:a="http://schemas.openxmlformats.org/drawingml/2006/main" xmlns:r="http://schemas.openxmlformats.org/officeDocument/2006/relationships" xmlns:p="http://schemas.openxmlformats.org/presentationml/2006/main">
+  <p:cSld>
+    <p:spTree>
+      <p:nvGrpSpPr>
+        <p:cNvPr id="1" name=""/>
+        <p:cNvGrpSpPr/>
+        <p:nvPr/>
+      </p:nvGrpSpPr>
+      <p:grpSpPr>
+        <a:xfrm>
+          <a:off x="0" y="0"/>
+          <a:ext cx="0" cy="0"/>
+          <a:chOff x="0" y="0"/>
+          <a:chExt cx="0" cy="0"/>
+        </a:xfrm>
+      </p:grpSpPr>
+      <p:sp>
+        <p:nvSpPr>
+          <p:cNvPr id="2" name="Slide Image Placeholder 1"/>
+          <p:cNvSpPr>
+            <a:spLocks noGrp="1" noRot="1" noChangeAspect="1"/>
+          </p:cNvSpPr>
+          <p:nvPr>
+            <p:ph type="sldImg"/>
+          </p:nvPr>
+        </p:nvSpPr>
+        <p:spPr/>
+      </p:sp>
+      <p:sp>
+        <p:nvSpPr>
+          <p:cNvPr id="3" name="Notes Placeholder 2"/>
+          <p:cNvSpPr>
+            <a:spLocks noGrp="1"/>
+          </p:cNvSpPr>
+          <p:nvPr>
+            <p:ph type="body" idx="1"/>
+          </p:nvPr>
+        </p:nvSpPr>
+        <p:spPr/>
+        <p:txBody>
+          <a:bodyPr/>
+          <a:lstStyle/>
+          <a:p>
+            <a:endParaRPr lang="en-US"/>
+          </a:p>
+        </p:txBody>
+      </p:sp>
+      <p:sp>
+        <p:nvSpPr>
+          <p:cNvPr id="4" name="Slide Number Placeholder 3"/>
+          <p:cNvSpPr>
+            <a:spLocks noGrp="1"/>
+          </p:cNvSpPr>
+          <p:nvPr>
+            <p:ph type="sldNum" sz="quarter" idx="5"/>
+          </p:nvPr>
+        </p:nvSpPr>
+        <p:spPr/>
+        <p:txBody>
+          <a:bodyPr/>
+          <a:lstStyle/>
+          <a:p>
+            <a:fld id="{C4DA8FDE-563B-4000-AD6C-C5B0ED2E1BBF}" type="slidenum">
+              <a:rPr lang="en-US" smtClean="0"/>
+              <a:t>4</a:t>
+            </a:fld>
+            <a:endParaRPr lang="en-US"/>
+          </a:p>
+        </p:txBody>
+      </p:sp>
+    </p:spTree>
+    <p:extLst>
+      <p:ext uri="{BB962C8B-B14F-4D97-AF65-F5344CB8AC3E}">
+        <p14:creationId xmlns:p14="http://schemas.microsoft.com/office/powerpoint/2010/main" val="3251754496"/>
+      </p:ext>
+    </p:extLst>
+  </p:cSld>
+  <p:clrMapOvr>
+    <a:masterClrMapping/>
+  </p:clrMapOvr>
+</p:notes>
+</file>
+
+<file path=ppt/notesSlides/notesSlide4.xml><?xml version="1.0" encoding="utf-8"?>
+<p:notes xmlns:a="http://schemas.openxmlformats.org/drawingml/2006/main" xmlns:r="http://schemas.openxmlformats.org/officeDocument/2006/relationships" xmlns:p="http://schemas.openxmlformats.org/presentationml/2006/main">
+  <p:cSld>
+    <p:spTree>
+      <p:nvGrpSpPr>
+        <p:cNvPr id="1" name=""/>
+        <p:cNvGrpSpPr/>
+        <p:nvPr/>
+      </p:nvGrpSpPr>
+      <p:grpSpPr>
+        <a:xfrm>
+          <a:off x="0" y="0"/>
+          <a:ext cx="0" cy="0"/>
+          <a:chOff x="0" y="0"/>
+          <a:chExt cx="0" cy="0"/>
+        </a:xfrm>
+      </p:grpSpPr>
+      <p:sp>
+        <p:nvSpPr>
+          <p:cNvPr id="2" name="Slide Image Placeholder 1"/>
+          <p:cNvSpPr>
+            <a:spLocks noGrp="1" noRot="1" noChangeAspect="1"/>
+          </p:cNvSpPr>
+          <p:nvPr>
+            <p:ph type="sldImg"/>
+          </p:nvPr>
+        </p:nvSpPr>
+        <p:spPr/>
+      </p:sp>
+      <p:sp>
+        <p:nvSpPr>
+          <p:cNvPr id="3" name="Notes Placeholder 2"/>
+          <p:cNvSpPr>
+            <a:spLocks noGrp="1"/>
+          </p:cNvSpPr>
+          <p:nvPr>
+            <p:ph type="body" idx="1"/>
+          </p:nvPr>
+        </p:nvSpPr>
+        <p:spPr/>
+        <p:txBody>
+          <a:bodyPr/>
+          <a:lstStyle/>
+          <a:p>
+            <a:endParaRPr lang="en-US"/>
+          </a:p>
+        </p:txBody>
+      </p:sp>
+      <p:sp>
+        <p:nvSpPr>
+          <p:cNvPr id="4" name="Slide Number Placeholder 3"/>
+          <p:cNvSpPr>
+            <a:spLocks noGrp="1"/>
+          </p:cNvSpPr>
+          <p:nvPr>
+            <p:ph type="sldNum" sz="quarter" idx="5"/>
+          </p:nvPr>
+        </p:nvSpPr>
+        <p:spPr/>
+        <p:txBody>
+          <a:bodyPr/>
+          <a:lstStyle/>
+          <a:p>
+            <a:fld id="{C4DA8FDE-563B-4000-AD6C-C5B0ED2E1BBF}" type="slidenum">
+              <a:rPr lang="en-US" smtClean="0"/>
+              <a:t>5</a:t>
+            </a:fld>
+            <a:endParaRPr lang="en-US"/>
+          </a:p>
+        </p:txBody>
+      </p:sp>
+    </p:spTree>
+    <p:extLst>
+      <p:ext uri="{BB962C8B-B14F-4D97-AF65-F5344CB8AC3E}">
+        <p14:creationId xmlns:p14="http://schemas.microsoft.com/office/powerpoint/2010/main" val="3319335881"/>
+      </p:ext>
+    </p:extLst>
+  </p:cSld>
+  <p:clrMapOvr>
+    <a:masterClrMapping/>
+  </p:clrMapOvr>
+</p:notes>
+</file>
+
+<file path=ppt/notesSlides/notesSlide5.xml><?xml version="1.0" encoding="utf-8"?>
+<p:notes xmlns:a="http://schemas.openxmlformats.org/drawingml/2006/main" xmlns:r="http://schemas.openxmlformats.org/officeDocument/2006/relationships" xmlns:p="http://schemas.openxmlformats.org/presentationml/2006/main">
+  <p:cSld>
+    <p:spTree>
+      <p:nvGrpSpPr>
+        <p:cNvPr id="1" name=""/>
+        <p:cNvGrpSpPr/>
+        <p:nvPr/>
+      </p:nvGrpSpPr>
+      <p:grpSpPr>
+        <a:xfrm>
+          <a:off x="0" y="0"/>
+          <a:ext cx="0" cy="0"/>
+          <a:chOff x="0" y="0"/>
+          <a:chExt cx="0" cy="0"/>
+        </a:xfrm>
+      </p:grpSpPr>
+      <p:sp>
+        <p:nvSpPr>
+          <p:cNvPr id="2" name="Slide Image Placeholder 1"/>
+          <p:cNvSpPr>
+            <a:spLocks noGrp="1" noRot="1" noChangeAspect="1"/>
+          </p:cNvSpPr>
+          <p:nvPr>
+            <p:ph type="sldImg"/>
+          </p:nvPr>
+        </p:nvSpPr>
+        <p:spPr/>
+      </p:sp>
+      <p:sp>
+        <p:nvSpPr>
+          <p:cNvPr id="3" name="Notes Placeholder 2"/>
+          <p:cNvSpPr>
+            <a:spLocks noGrp="1"/>
+          </p:cNvSpPr>
+          <p:nvPr>
+            <p:ph type="body" idx="1"/>
+          </p:nvPr>
+        </p:nvSpPr>
+        <p:spPr/>
+        <p:txBody>
+          <a:bodyPr/>
+          <a:lstStyle/>
+          <a:p>
+            <a:endParaRPr lang="en-US"/>
+          </a:p>
+        </p:txBody>
+      </p:sp>
+      <p:sp>
+        <p:nvSpPr>
+          <p:cNvPr id="4" name="Slide Number Placeholder 3"/>
+          <p:cNvSpPr>
+            <a:spLocks noGrp="1"/>
+          </p:cNvSpPr>
+          <p:nvPr>
+            <p:ph type="sldNum" sz="quarter" idx="5"/>
+          </p:nvPr>
+        </p:nvSpPr>
+        <p:spPr/>
+        <p:txBody>
+          <a:bodyPr/>
+          <a:lstStyle/>
+          <a:p>
+            <a:fld id="{C4DA8FDE-563B-4000-AD6C-C5B0ED2E1BBF}" type="slidenum">
+              <a:rPr lang="en-US" smtClean="0"/>
+              <a:t>6</a:t>
+            </a:fld>
+            <a:endParaRPr lang="en-US"/>
+          </a:p>
+        </p:txBody>
+      </p:sp>
+    </p:spTree>
+    <p:extLst>
+      <p:ext uri="{BB962C8B-B14F-4D97-AF65-F5344CB8AC3E}">
+        <p14:creationId xmlns:p14="http://schemas.microsoft.com/office/powerpoint/2010/main" val="1906045774"/>
+      </p:ext>
+    </p:extLst>
+  </p:cSld>
+  <p:clrMapOvr>
+    <a:masterClrMapping/>
+  </p:clrMapOvr>
+</p:notes>
+</file>
+
+<file path=ppt/notesSlides/notesSlide6.xml><?xml version="1.0" encoding="utf-8"?>
+<p:notes xmlns:a="http://schemas.openxmlformats.org/drawingml/2006/main" xmlns:r="http://schemas.openxmlformats.org/officeDocument/2006/relationships" xmlns:p="http://schemas.openxmlformats.org/presentationml/2006/main">
+  <p:cSld>
+    <p:spTree>
+      <p:nvGrpSpPr>
+        <p:cNvPr id="1" name=""/>
+        <p:cNvGrpSpPr/>
+        <p:nvPr/>
+      </p:nvGrpSpPr>
+      <p:grpSpPr>
+        <a:xfrm>
+          <a:off x="0" y="0"/>
+          <a:ext cx="0" cy="0"/>
+          <a:chOff x="0" y="0"/>
+          <a:chExt cx="0" cy="0"/>
+        </a:xfrm>
+      </p:grpSpPr>
+      <p:sp>
+        <p:nvSpPr>
+          <p:cNvPr id="2" name="Slide Image Placeholder 1"/>
+          <p:cNvSpPr>
+            <a:spLocks noGrp="1" noRot="1" noChangeAspect="1"/>
+          </p:cNvSpPr>
+          <p:nvPr>
+            <p:ph type="sldImg"/>
+          </p:nvPr>
+        </p:nvSpPr>
+        <p:spPr/>
+      </p:sp>
+      <p:sp>
+        <p:nvSpPr>
+          <p:cNvPr id="3" name="Notes Placeholder 2"/>
+          <p:cNvSpPr>
+            <a:spLocks noGrp="1"/>
+          </p:cNvSpPr>
+          <p:nvPr>
+            <p:ph type="body" idx="1"/>
+          </p:nvPr>
+        </p:nvSpPr>
+        <p:spPr/>
+        <p:txBody>
+          <a:bodyPr/>
+          <a:lstStyle/>
+          <a:p>
+            <a:endParaRPr lang="en-US"/>
+          </a:p>
+        </p:txBody>
+      </p:sp>
+      <p:sp>
+        <p:nvSpPr>
+          <p:cNvPr id="4" name="Slide Number Placeholder 3"/>
+          <p:cNvSpPr>
+            <a:spLocks noGrp="1"/>
+          </p:cNvSpPr>
+          <p:nvPr>
+            <p:ph type="sldNum" sz="quarter" idx="5"/>
+          </p:nvPr>
+        </p:nvSpPr>
+        <p:spPr/>
+        <p:txBody>
+          <a:bodyPr/>
+          <a:lstStyle/>
+          <a:p>
+            <a:fld id="{C4DA8FDE-563B-4000-AD6C-C5B0ED2E1BBF}" type="slidenum">
+              <a:rPr lang="en-US" smtClean="0"/>
+              <a:t>7</a:t>
+            </a:fld>
+            <a:endParaRPr lang="en-US"/>
+          </a:p>
+        </p:txBody>
+      </p:sp>
+    </p:spTree>
+    <p:extLst>
+      <p:ext uri="{BB962C8B-B14F-4D97-AF65-F5344CB8AC3E}">
+        <p14:creationId xmlns:p14="http://schemas.microsoft.com/office/powerpoint/2010/main" val="3260775711"/>
+      </p:ext>
+    </p:extLst>
+  </p:cSld>
+  <p:clrMapOvr>
+    <a:masterClrMapping/>
+  </p:clrMapOvr>
+</p:notes>
+</file>
+
+<file path=ppt/notesSlides/notesSlide7.xml><?xml version="1.0" encoding="utf-8"?>
+<p:notes xmlns:a="http://schemas.openxmlformats.org/drawingml/2006/main" xmlns:r="http://schemas.openxmlformats.org/officeDocument/2006/relationships" xmlns:p="http://schemas.openxmlformats.org/presentationml/2006/main">
+  <p:cSld>
+    <p:spTree>
+      <p:nvGrpSpPr>
+        <p:cNvPr id="1" name=""/>
+        <p:cNvGrpSpPr/>
+        <p:nvPr/>
+      </p:nvGrpSpPr>
+      <p:grpSpPr>
+        <a:xfrm>
+          <a:off x="0" y="0"/>
+          <a:ext cx="0" cy="0"/>
+          <a:chOff x="0" y="0"/>
+          <a:chExt cx="0" cy="0"/>
+        </a:xfrm>
+      </p:grpSpPr>
+      <p:sp>
+        <p:nvSpPr>
+          <p:cNvPr id="2" name="Slide Image Placeholder 1"/>
+          <p:cNvSpPr>
+            <a:spLocks noGrp="1" noRot="1" noChangeAspect="1"/>
+          </p:cNvSpPr>
+          <p:nvPr>
+            <p:ph type="sldImg"/>
+          </p:nvPr>
+        </p:nvSpPr>
+        <p:spPr/>
+      </p:sp>
+      <p:sp>
+        <p:nvSpPr>
+          <p:cNvPr id="3" name="Notes Placeholder 2"/>
+          <p:cNvSpPr>
+            <a:spLocks noGrp="1"/>
+          </p:cNvSpPr>
+          <p:nvPr>
+            <p:ph type="body" idx="1"/>
+          </p:nvPr>
+        </p:nvSpPr>
+        <p:spPr/>
+        <p:txBody>
+          <a:bodyPr/>
+          <a:lstStyle/>
+          <a:p>
+            <a:endParaRPr lang="en-US"/>
+          </a:p>
+        </p:txBody>
+      </p:sp>
+      <p:sp>
+        <p:nvSpPr>
+          <p:cNvPr id="4" name="Slide Number Placeholder 3"/>
+          <p:cNvSpPr>
+            <a:spLocks noGrp="1"/>
+          </p:cNvSpPr>
+          <p:nvPr>
+            <p:ph type="sldNum" sz="quarter" idx="5"/>
+          </p:nvPr>
+        </p:nvSpPr>
+        <p:spPr/>
+        <p:txBody>
+          <a:bodyPr/>
+          <a:lstStyle/>
+          <a:p>
+            <a:fld id="{C4DA8FDE-563B-4000-AD6C-C5B0ED2E1BBF}" type="slidenum">
+              <a:rPr lang="en-US" smtClean="0"/>
+              <a:t>8</a:t>
+            </a:fld>
+            <a:endParaRPr lang="en-US"/>
+          </a:p>
+        </p:txBody>
+      </p:sp>
+    </p:spTree>
+    <p:extLst>
+      <p:ext uri="{BB962C8B-B14F-4D97-AF65-F5344CB8AC3E}">
+        <p14:creationId xmlns:p14="http://schemas.microsoft.com/office/powerpoint/2010/main" val="3411480978"/>
+      </p:ext>
+    </p:extLst>
+  </p:cSld>
+  <p:clrMapOvr>
+    <a:masterClrMapping/>
+  </p:clrMapOvr>
+</p:notes>
+</file>
+
 <file path=ppt/slideLayouts/slideLayout1.xml><?xml version="1.0" encoding="utf-8"?>
 <p:sldLayout xmlns:a="http://schemas.openxmlformats.org/drawingml/2006/main" xmlns:r="http://schemas.openxmlformats.org/officeDocument/2006/relationships" xmlns:p="http://schemas.openxmlformats.org/presentationml/2006/main" type="title" preserve="1">
   <p:cSld name="Title Slide">
@@ -260,7 +1206,7 @@
           <a:p>
             <a:fld id="{A94FC3E2-769E-414E-A094-DC8FE9DC1C08}" type="datetimeFigureOut">
               <a:rPr lang="en-US" smtClean="0"/>
-              <a:t>9/10/2023</a:t>
+              <a:t>9/11/2023</a:t>
             </a:fld>
             <a:endParaRPr lang="en-US"/>
           </a:p>
@@ -458,7 +1404,7 @@
           <a:p>
             <a:fld id="{A94FC3E2-769E-414E-A094-DC8FE9DC1C08}" type="datetimeFigureOut">
               <a:rPr lang="en-US" smtClean="0"/>
-              <a:t>9/10/2023</a:t>
+              <a:t>9/11/2023</a:t>
             </a:fld>
             <a:endParaRPr lang="en-US"/>
           </a:p>
@@ -666,7 +1612,7 @@
           <a:p>
             <a:fld id="{A94FC3E2-769E-414E-A094-DC8FE9DC1C08}" type="datetimeFigureOut">
               <a:rPr lang="en-US" smtClean="0"/>
-              <a:t>9/10/2023</a:t>
+              <a:t>9/11/2023</a:t>
             </a:fld>
             <a:endParaRPr lang="en-US"/>
           </a:p>
@@ -864,7 +1810,7 @@
           <a:p>
             <a:fld id="{A94FC3E2-769E-414E-A094-DC8FE9DC1C08}" type="datetimeFigureOut">
               <a:rPr lang="en-US" smtClean="0"/>
-              <a:t>9/10/2023</a:t>
+              <a:t>9/11/2023</a:t>
             </a:fld>
             <a:endParaRPr lang="en-US"/>
           </a:p>
@@ -1139,7 +2085,7 @@
           <a:p>
             <a:fld id="{A94FC3E2-769E-414E-A094-DC8FE9DC1C08}" type="datetimeFigureOut">
               <a:rPr lang="en-US" smtClean="0"/>
-              <a:t>9/10/2023</a:t>
+              <a:t>9/11/2023</a:t>
             </a:fld>
             <a:endParaRPr lang="en-US"/>
           </a:p>
@@ -1404,7 +2350,7 @@
           <a:p>
             <a:fld id="{A94FC3E2-769E-414E-A094-DC8FE9DC1C08}" type="datetimeFigureOut">
               <a:rPr lang="en-US" smtClean="0"/>
-              <a:t>9/10/2023</a:t>
+              <a:t>9/11/2023</a:t>
             </a:fld>
             <a:endParaRPr lang="en-US"/>
           </a:p>
@@ -1816,7 +2762,7 @@
           <a:p>
             <a:fld id="{A94FC3E2-769E-414E-A094-DC8FE9DC1C08}" type="datetimeFigureOut">
               <a:rPr lang="en-US" smtClean="0"/>
-              <a:t>9/10/2023</a:t>
+              <a:t>9/11/2023</a:t>
             </a:fld>
             <a:endParaRPr lang="en-US"/>
           </a:p>
@@ -1957,7 +2903,7 @@
           <a:p>
             <a:fld id="{A94FC3E2-769E-414E-A094-DC8FE9DC1C08}" type="datetimeFigureOut">
               <a:rPr lang="en-US" smtClean="0"/>
-              <a:t>9/10/2023</a:t>
+              <a:t>9/11/2023</a:t>
             </a:fld>
             <a:endParaRPr lang="en-US"/>
           </a:p>
@@ -2070,7 +3016,7 @@
           <a:p>
             <a:fld id="{A94FC3E2-769E-414E-A094-DC8FE9DC1C08}" type="datetimeFigureOut">
               <a:rPr lang="en-US" smtClean="0"/>
-              <a:t>9/10/2023</a:t>
+              <a:t>9/11/2023</a:t>
             </a:fld>
             <a:endParaRPr lang="en-US"/>
           </a:p>
@@ -2381,7 +3327,7 @@
           <a:p>
             <a:fld id="{A94FC3E2-769E-414E-A094-DC8FE9DC1C08}" type="datetimeFigureOut">
               <a:rPr lang="en-US" smtClean="0"/>
-              <a:t>9/10/2023</a:t>
+              <a:t>9/11/2023</a:t>
             </a:fld>
             <a:endParaRPr lang="en-US"/>
           </a:p>
@@ -2669,7 +3615,7 @@
           <a:p>
             <a:fld id="{A94FC3E2-769E-414E-A094-DC8FE9DC1C08}" type="datetimeFigureOut">
               <a:rPr lang="en-US" smtClean="0"/>
-              <a:t>9/10/2023</a:t>
+              <a:t>9/11/2023</a:t>
             </a:fld>
             <a:endParaRPr lang="en-US"/>
           </a:p>
@@ -2910,7 +3856,7 @@
           <a:p>
             <a:fld id="{A94FC3E2-769E-414E-A094-DC8FE9DC1C08}" type="datetimeFigureOut">
               <a:rPr lang="en-US" smtClean="0"/>
-              <a:t>9/10/2023</a:t>
+              <a:t>9/11/2023</a:t>
             </a:fld>
             <a:endParaRPr lang="en-US"/>
           </a:p>
@@ -3426,12 +4372,195 @@
           <a:chExt cx="0" cy="0"/>
         </a:xfrm>
       </p:grpSpPr>
+      <p:sp>
+        <p:nvSpPr>
+          <p:cNvPr id="8" name="TextBox 7">
+            <a:extLst>
+              <a:ext uri="{FF2B5EF4-FFF2-40B4-BE49-F238E27FC236}">
+                <a16:creationId xmlns:a16="http://schemas.microsoft.com/office/drawing/2014/main" id="{B36328CF-89B9-017F-51F3-040A9719FE98}"/>
+              </a:ext>
+            </a:extLst>
+          </p:cNvPr>
+          <p:cNvSpPr txBox="1"/>
+          <p:nvPr/>
+        </p:nvSpPr>
+        <p:spPr>
+          <a:xfrm>
+            <a:off x="355715" y="112166"/>
+            <a:ext cx="3223260" cy="1323439"/>
+          </a:xfrm>
+          <a:prstGeom prst="rect">
+            <a:avLst/>
+          </a:prstGeom>
+          <a:noFill/>
+        </p:spPr>
+        <p:txBody>
+          <a:bodyPr wrap="square">
+            <a:spAutoFit/>
+          </a:bodyPr>
+          <a:lstStyle/>
+          <a:p>
+            <a:r>
+              <a:rPr lang="en-US" sz="8000" b="1" dirty="0">
+                <a:latin typeface="Times New Roman" panose="02020603050405020304" pitchFamily="18" charset="0"/>
+                <a:cs typeface="Times New Roman" panose="02020603050405020304" pitchFamily="18" charset="0"/>
+              </a:rPr>
+              <a:t>Start:</a:t>
+            </a:r>
+            <a:endParaRPr lang="en-US" sz="1400" dirty="0"/>
+          </a:p>
+        </p:txBody>
+      </p:sp>
+      <p:sp>
+        <p:nvSpPr>
+          <p:cNvPr id="9" name="TextBox 8">
+            <a:extLst>
+              <a:ext uri="{FF2B5EF4-FFF2-40B4-BE49-F238E27FC236}">
+                <a16:creationId xmlns:a16="http://schemas.microsoft.com/office/drawing/2014/main" id="{290DFA55-1975-7D67-D439-2F9ECD0CDA02}"/>
+              </a:ext>
+            </a:extLst>
+          </p:cNvPr>
+          <p:cNvSpPr txBox="1"/>
+          <p:nvPr/>
+        </p:nvSpPr>
+        <p:spPr>
+          <a:xfrm>
+            <a:off x="3468369" y="570558"/>
+            <a:ext cx="6128212" cy="954107"/>
+          </a:xfrm>
+          <a:prstGeom prst="rect">
+            <a:avLst/>
+          </a:prstGeom>
+          <a:noFill/>
+        </p:spPr>
+        <p:txBody>
+          <a:bodyPr wrap="square">
+            <a:spAutoFit/>
+          </a:bodyPr>
+          <a:lstStyle/>
+          <a:p>
+            <a:r>
+              <a:rPr lang="en-US" sz="2800" b="1" dirty="0">
+                <a:latin typeface="Times New Roman" panose="02020603050405020304" pitchFamily="18" charset="0"/>
+                <a:cs typeface="Times New Roman" panose="02020603050405020304" pitchFamily="18" charset="0"/>
+              </a:rPr>
+              <a:t>Calculate Excess Return and Volatility for each trader in the competition.</a:t>
+            </a:r>
+            <a:endParaRPr lang="en-US" sz="2800" dirty="0"/>
+          </a:p>
+        </p:txBody>
+      </p:sp>
+      <p:sp>
+        <p:nvSpPr>
+          <p:cNvPr id="10" name="TextBox 9">
+            <a:extLst>
+              <a:ext uri="{FF2B5EF4-FFF2-40B4-BE49-F238E27FC236}">
+                <a16:creationId xmlns:a16="http://schemas.microsoft.com/office/drawing/2014/main" id="{B5C5640F-FF9A-4894-4FB8-85EE0E16A580}"/>
+              </a:ext>
+            </a:extLst>
+          </p:cNvPr>
+          <p:cNvSpPr txBox="1"/>
+          <p:nvPr/>
+        </p:nvSpPr>
+        <p:spPr>
+          <a:xfrm>
+            <a:off x="3578975" y="1646882"/>
+            <a:ext cx="6433012" cy="1384995"/>
+          </a:xfrm>
+          <a:prstGeom prst="rect">
+            <a:avLst/>
+          </a:prstGeom>
+          <a:noFill/>
+        </p:spPr>
+        <p:txBody>
+          <a:bodyPr wrap="square">
+            <a:spAutoFit/>
+          </a:bodyPr>
+          <a:lstStyle/>
+          <a:p>
+            <a:pPr marL="457200" indent="-457200">
+              <a:buFont typeface="Arial" panose="020B0604020202020204" pitchFamily="34" charset="0"/>
+              <a:buChar char="•"/>
+            </a:pPr>
+            <a:r>
+              <a:rPr lang="en-US" sz="2800" b="1" dirty="0">
+                <a:latin typeface="Times New Roman" panose="02020603050405020304" pitchFamily="18" charset="0"/>
+                <a:cs typeface="Times New Roman" panose="02020603050405020304" pitchFamily="18" charset="0"/>
+              </a:rPr>
+              <a:t>Performed </a:t>
+            </a:r>
+            <a:r>
+              <a:rPr lang="en-US" sz="2800" b="1" u="sng" dirty="0">
+                <a:latin typeface="Times New Roman" panose="02020603050405020304" pitchFamily="18" charset="0"/>
+                <a:cs typeface="Times New Roman" panose="02020603050405020304" pitchFamily="18" charset="0"/>
+              </a:rPr>
+              <a:t>daily</a:t>
+            </a:r>
+            <a:r>
+              <a:rPr lang="en-US" sz="2800" b="1" dirty="0">
+                <a:latin typeface="Times New Roman" panose="02020603050405020304" pitchFamily="18" charset="0"/>
+                <a:cs typeface="Times New Roman" panose="02020603050405020304" pitchFamily="18" charset="0"/>
+              </a:rPr>
+              <a:t> as data are available</a:t>
+            </a:r>
+          </a:p>
+          <a:p>
+            <a:pPr marL="457200" indent="-457200">
+              <a:buFont typeface="Arial" panose="020B0604020202020204" pitchFamily="34" charset="0"/>
+              <a:buChar char="•"/>
+            </a:pPr>
+            <a:r>
+              <a:rPr lang="en-US" sz="2800" b="1" dirty="0">
+                <a:latin typeface="Times New Roman" panose="02020603050405020304" pitchFamily="18" charset="0"/>
+                <a:cs typeface="Times New Roman" panose="02020603050405020304" pitchFamily="18" charset="0"/>
+              </a:rPr>
+              <a:t>Based on end-of-day Net Asset Value (NAV) starting on 01 Oct 2023</a:t>
+            </a:r>
+            <a:endParaRPr lang="en-US" sz="2800" b="1" u="sng" dirty="0">
+              <a:latin typeface="Times New Roman" panose="02020603050405020304" pitchFamily="18" charset="0"/>
+              <a:cs typeface="Times New Roman" panose="02020603050405020304" pitchFamily="18" charset="0"/>
+            </a:endParaRPr>
+          </a:p>
+        </p:txBody>
+      </p:sp>
+      <p:sp>
+        <p:nvSpPr>
+          <p:cNvPr id="11" name="TextBox 10">
+            <a:extLst>
+              <a:ext uri="{FF2B5EF4-FFF2-40B4-BE49-F238E27FC236}">
+                <a16:creationId xmlns:a16="http://schemas.microsoft.com/office/drawing/2014/main" id="{296CFFC8-3CC9-61EF-968C-6574BBF1EE2B}"/>
+              </a:ext>
+            </a:extLst>
+          </p:cNvPr>
+          <p:cNvSpPr txBox="1"/>
+          <p:nvPr/>
+        </p:nvSpPr>
+        <p:spPr>
+          <a:xfrm>
+            <a:off x="1063468" y="2339380"/>
+            <a:ext cx="7677694" cy="523220"/>
+          </a:xfrm>
+          <a:prstGeom prst="rect">
+            <a:avLst/>
+          </a:prstGeom>
+          <a:noFill/>
+        </p:spPr>
+        <p:txBody>
+          <a:bodyPr wrap="square">
+            <a:spAutoFit/>
+          </a:bodyPr>
+          <a:lstStyle/>
+          <a:p>
+            <a:endParaRPr lang="en-US" sz="2800" u="sng" dirty="0"/>
+          </a:p>
+        </p:txBody>
+      </p:sp>
       <p:pic>
         <p:nvPicPr>
-          <p:cNvPr id="4" name="Picture 3">
-            <a:extLst>
-              <a:ext uri="{FF2B5EF4-FFF2-40B4-BE49-F238E27FC236}">
-                <a16:creationId xmlns:a16="http://schemas.microsoft.com/office/drawing/2014/main" id="{718DFBCC-074A-5ED3-A9FF-B4BD5EE98370}"/>
+          <p:cNvPr id="3" name="Picture 2">
+            <a:extLst>
+              <a:ext uri="{FF2B5EF4-FFF2-40B4-BE49-F238E27FC236}">
+                <a16:creationId xmlns:a16="http://schemas.microsoft.com/office/drawing/2014/main" id="{EC2E1065-3CD0-EBF8-C700-9328CDAE558D}"/>
               </a:ext>
             </a:extLst>
           </p:cNvPr>
@@ -3441,21 +4570,118 @@
           <p:nvPr/>
         </p:nvPicPr>
         <p:blipFill>
-          <a:blip r:embed="rId2"/>
+          <a:blip r:embed="rId3"/>
           <a:stretch>
             <a:fillRect/>
           </a:stretch>
         </p:blipFill>
         <p:spPr>
           <a:xfrm>
-            <a:off x="453414" y="129243"/>
-            <a:ext cx="3632136" cy="6362996"/>
+            <a:off x="355715" y="1737917"/>
+            <a:ext cx="3039837" cy="4952660"/>
           </a:xfrm>
           <a:prstGeom prst="rect">
             <a:avLst/>
           </a:prstGeom>
         </p:spPr>
       </p:pic>
+      <p:sp>
+        <p:nvSpPr>
+          <p:cNvPr id="5" name="TextBox 4">
+            <a:extLst>
+              <a:ext uri="{FF2B5EF4-FFF2-40B4-BE49-F238E27FC236}">
+                <a16:creationId xmlns:a16="http://schemas.microsoft.com/office/drawing/2014/main" id="{C2679E5F-1F89-0E42-9EC8-08C5F1B36B19}"/>
+              </a:ext>
+            </a:extLst>
+          </p:cNvPr>
+          <p:cNvSpPr txBox="1"/>
+          <p:nvPr/>
+        </p:nvSpPr>
+        <p:spPr>
+          <a:xfrm>
+            <a:off x="3738592" y="4072319"/>
+            <a:ext cx="4010718" cy="1815882"/>
+          </a:xfrm>
+          <a:prstGeom prst="rect">
+            <a:avLst/>
+          </a:prstGeom>
+          <a:noFill/>
+          <a:ln w="19050">
+            <a:solidFill>
+              <a:schemeClr val="tx2"/>
+            </a:solidFill>
+          </a:ln>
+        </p:spPr>
+        <p:txBody>
+          <a:bodyPr wrap="square">
+            <a:spAutoFit/>
+          </a:bodyPr>
+          <a:lstStyle/>
+          <a:p>
+            <a:r>
+              <a:rPr lang="en-US" sz="2800" b="1" dirty="0">
+                <a:latin typeface="Times New Roman" panose="02020603050405020304" pitchFamily="18" charset="0"/>
+                <a:cs typeface="Times New Roman" panose="02020603050405020304" pitchFamily="18" charset="0"/>
+              </a:rPr>
+              <a:t>See the “</a:t>
+            </a:r>
+            <a:r>
+              <a:rPr lang="en-US" sz="2800" b="1" dirty="0">
+                <a:solidFill>
+                  <a:schemeClr val="accent1"/>
+                </a:solidFill>
+                <a:latin typeface="Times New Roman" panose="02020603050405020304" pitchFamily="18" charset="0"/>
+                <a:cs typeface="Times New Roman" panose="02020603050405020304" pitchFamily="18" charset="0"/>
+              </a:rPr>
+              <a:t>Calculating Excess Return, Volatility and Sharpe</a:t>
+            </a:r>
+            <a:r>
+              <a:rPr lang="en-US" sz="2800" b="1" dirty="0">
+                <a:latin typeface="Times New Roman" panose="02020603050405020304" pitchFamily="18" charset="0"/>
+                <a:cs typeface="Times New Roman" panose="02020603050405020304" pitchFamily="18" charset="0"/>
+              </a:rPr>
+              <a:t>” page under “Scoring” for details.</a:t>
+            </a:r>
+            <a:r>
+              <a:rPr lang="en-US" sz="2800" b="1" u="sng" dirty="0">
+                <a:latin typeface="Times New Roman" panose="02020603050405020304" pitchFamily="18" charset="0"/>
+                <a:cs typeface="Times New Roman" panose="02020603050405020304" pitchFamily="18" charset="0"/>
+              </a:rPr>
+              <a:t> </a:t>
+            </a:r>
+          </a:p>
+        </p:txBody>
+      </p:sp>
+    </p:spTree>
+    <p:extLst>
+      <p:ext uri="{BB962C8B-B14F-4D97-AF65-F5344CB8AC3E}">
+        <p14:creationId xmlns:p14="http://schemas.microsoft.com/office/powerpoint/2010/main" val="2573534866"/>
+      </p:ext>
+    </p:extLst>
+  </p:cSld>
+  <p:clrMapOvr>
+    <a:masterClrMapping/>
+  </p:clrMapOvr>
+</p:sld>
+</file>
+
+<file path=ppt/slides/slide3.xml><?xml version="1.0" encoding="utf-8"?>
+<p:sld xmlns:a="http://schemas.openxmlformats.org/drawingml/2006/main" xmlns:r="http://schemas.openxmlformats.org/officeDocument/2006/relationships" xmlns:p="http://schemas.openxmlformats.org/presentationml/2006/main">
+  <p:cSld>
+    <p:spTree>
+      <p:nvGrpSpPr>
+        <p:cNvPr id="1" name=""/>
+        <p:cNvGrpSpPr/>
+        <p:nvPr/>
+      </p:nvGrpSpPr>
+      <p:grpSpPr>
+        <a:xfrm>
+          <a:off x="0" y="0"/>
+          <a:ext cx="0" cy="0"/>
+          <a:chOff x="0" y="0"/>
+          <a:chExt cx="0" cy="0"/>
+        </a:xfrm>
+      </p:grpSpPr>
       <p:sp>
         <p:nvSpPr>
           <p:cNvPr id="8" name="TextBox 7">
@@ -3509,8 +4735,8 @@
         </p:nvSpPr>
         <p:spPr>
           <a:xfrm>
-            <a:off x="7962900" y="50610"/>
-            <a:ext cx="4229100" cy="1384995"/>
+            <a:off x="4379323" y="1492200"/>
+            <a:ext cx="7175368" cy="523220"/>
           </a:xfrm>
           <a:prstGeom prst="rect">
             <a:avLst/>
@@ -3528,108 +4754,9 @@
                 <a:latin typeface="Times New Roman" panose="02020603050405020304" pitchFamily="18" charset="0"/>
                 <a:cs typeface="Times New Roman" panose="02020603050405020304" pitchFamily="18" charset="0"/>
               </a:rPr>
-              <a:t>Calculate Excess Return and Volatility for each trader in the competition.</a:t>
+              <a:t>Sort the traders by decreasing excess return.</a:t>
             </a:r>
             <a:endParaRPr lang="en-US" sz="2800" dirty="0"/>
-          </a:p>
-        </p:txBody>
-      </p:sp>
-      <p:sp>
-        <p:nvSpPr>
-          <p:cNvPr id="10" name="TextBox 9">
-            <a:extLst>
-              <a:ext uri="{FF2B5EF4-FFF2-40B4-BE49-F238E27FC236}">
-                <a16:creationId xmlns:a16="http://schemas.microsoft.com/office/drawing/2014/main" id="{B5C5640F-FF9A-4894-4FB8-85EE0E16A580}"/>
-              </a:ext>
-            </a:extLst>
-          </p:cNvPr>
-          <p:cNvSpPr txBox="1"/>
-          <p:nvPr/>
-        </p:nvSpPr>
-        <p:spPr>
-          <a:xfrm>
-            <a:off x="4219303" y="1639923"/>
-            <a:ext cx="7677694" cy="2246769"/>
-          </a:xfrm>
-          <a:prstGeom prst="rect">
-            <a:avLst/>
-          </a:prstGeom>
-          <a:noFill/>
-        </p:spPr>
-        <p:txBody>
-          <a:bodyPr wrap="square">
-            <a:spAutoFit/>
-          </a:bodyPr>
-          <a:lstStyle/>
-          <a:p>
-            <a:pPr marL="457200" indent="-457200">
-              <a:buFont typeface="Arial" panose="020B0604020202020204" pitchFamily="34" charset="0"/>
-              <a:buChar char="•"/>
-            </a:pPr>
-            <a:r>
-              <a:rPr lang="en-US" sz="2800" b="1" dirty="0">
-                <a:latin typeface="Times New Roman" panose="02020603050405020304" pitchFamily="18" charset="0"/>
-                <a:cs typeface="Times New Roman" panose="02020603050405020304" pitchFamily="18" charset="0"/>
-              </a:rPr>
-              <a:t>Performed </a:t>
-            </a:r>
-            <a:r>
-              <a:rPr lang="en-US" sz="2800" b="1" u="sng" dirty="0">
-                <a:latin typeface="Times New Roman" panose="02020603050405020304" pitchFamily="18" charset="0"/>
-                <a:cs typeface="Times New Roman" panose="02020603050405020304" pitchFamily="18" charset="0"/>
-              </a:rPr>
-              <a:t>daily</a:t>
-            </a:r>
-            <a:r>
-              <a:rPr lang="en-US" sz="2800" b="1" dirty="0">
-                <a:latin typeface="Times New Roman" panose="02020603050405020304" pitchFamily="18" charset="0"/>
-                <a:cs typeface="Times New Roman" panose="02020603050405020304" pitchFamily="18" charset="0"/>
-              </a:rPr>
-              <a:t> as data are available</a:t>
-            </a:r>
-          </a:p>
-          <a:p>
-            <a:pPr marL="457200" indent="-457200">
-              <a:buFont typeface="Arial" panose="020B0604020202020204" pitchFamily="34" charset="0"/>
-              <a:buChar char="•"/>
-            </a:pPr>
-            <a:r>
-              <a:rPr lang="en-US" sz="2800" b="1" dirty="0">
-                <a:latin typeface="Times New Roman" panose="02020603050405020304" pitchFamily="18" charset="0"/>
-                <a:cs typeface="Times New Roman" panose="02020603050405020304" pitchFamily="18" charset="0"/>
-              </a:rPr>
-              <a:t>Based on end-of-day Net Asset Value (NAV) starting on 01 </a:t>
-            </a:r>
-            <a:r>
-              <a:rPr lang="en-US" sz="2800" b="1">
-                <a:latin typeface="Times New Roman" panose="02020603050405020304" pitchFamily="18" charset="0"/>
-                <a:cs typeface="Times New Roman" panose="02020603050405020304" pitchFamily="18" charset="0"/>
-              </a:rPr>
-              <a:t>Oct 2023</a:t>
-            </a:r>
-          </a:p>
-          <a:p>
-            <a:pPr marL="457200" indent="-457200">
-              <a:buFont typeface="Arial" panose="020B0604020202020204" pitchFamily="34" charset="0"/>
-              <a:buChar char="•"/>
-            </a:pPr>
-            <a:endParaRPr lang="en-US" sz="2800" b="1" u="sng" dirty="0">
-              <a:latin typeface="Times New Roman" panose="02020603050405020304" pitchFamily="18" charset="0"/>
-              <a:cs typeface="Times New Roman" panose="02020603050405020304" pitchFamily="18" charset="0"/>
-            </a:endParaRPr>
-          </a:p>
-          <a:p>
-            <a:pPr marL="457200" indent="-457200">
-              <a:buFont typeface="Arial" panose="020B0604020202020204" pitchFamily="34" charset="0"/>
-              <a:buChar char="•"/>
-            </a:pPr>
-            <a:r>
-              <a:rPr lang="en-US" sz="2800" b="1" dirty="0">
-                <a:latin typeface="Times New Roman" panose="02020603050405020304" pitchFamily="18" charset="0"/>
-                <a:cs typeface="Times New Roman" panose="02020603050405020304" pitchFamily="18" charset="0"/>
-              </a:rPr>
-              <a:t>Excess Return is defined as </a:t>
-            </a:r>
           </a:p>
         </p:txBody>
       </p:sp>
@@ -3665,10 +4792,1490 @@
           </a:p>
         </p:txBody>
       </p:sp>
+      <p:pic>
+        <p:nvPicPr>
+          <p:cNvPr id="5" name="Picture 4">
+            <a:extLst>
+              <a:ext uri="{FF2B5EF4-FFF2-40B4-BE49-F238E27FC236}">
+                <a16:creationId xmlns:a16="http://schemas.microsoft.com/office/drawing/2014/main" id="{023DDEFD-9129-8ADD-746E-3DC0986741C7}"/>
+              </a:ext>
+            </a:extLst>
+          </p:cNvPr>
+          <p:cNvPicPr>
+            <a:picLocks noChangeAspect="1"/>
+          </p:cNvPicPr>
+          <p:nvPr/>
+        </p:nvPicPr>
+        <p:blipFill>
+          <a:blip r:embed="rId3"/>
+          <a:stretch>
+            <a:fillRect/>
+          </a:stretch>
+        </p:blipFill>
+        <p:spPr>
+          <a:xfrm>
+            <a:off x="134983" y="372107"/>
+            <a:ext cx="3749619" cy="6113786"/>
+          </a:xfrm>
+          <a:prstGeom prst="rect">
+            <a:avLst/>
+          </a:prstGeom>
+        </p:spPr>
+      </p:pic>
+      <p:cxnSp>
+        <p:nvCxnSpPr>
+          <p:cNvPr id="7" name="Straight Arrow Connector 6">
+            <a:extLst>
+              <a:ext uri="{FF2B5EF4-FFF2-40B4-BE49-F238E27FC236}">
+                <a16:creationId xmlns:a16="http://schemas.microsoft.com/office/drawing/2014/main" id="{3B25A396-4515-C33C-0AF2-BCDFDB344815}"/>
+              </a:ext>
+            </a:extLst>
+          </p:cNvPr>
+          <p:cNvCxnSpPr/>
+          <p:nvPr/>
+        </p:nvCxnSpPr>
+        <p:spPr>
+          <a:xfrm>
+            <a:off x="1560946" y="234879"/>
+            <a:ext cx="0" cy="6388241"/>
+          </a:xfrm>
+          <a:prstGeom prst="straightConnector1">
+            <a:avLst/>
+          </a:prstGeom>
+          <a:ln w="41275">
+            <a:solidFill>
+              <a:srgbClr val="FF0000"/>
+            </a:solidFill>
+            <a:tailEnd type="triangle" w="lg" len="lg"/>
+          </a:ln>
+        </p:spPr>
+        <p:style>
+          <a:lnRef idx="1">
+            <a:schemeClr val="accent1"/>
+          </a:lnRef>
+          <a:fillRef idx="0">
+            <a:schemeClr val="accent1"/>
+          </a:fillRef>
+          <a:effectRef idx="0">
+            <a:schemeClr val="accent1"/>
+          </a:effectRef>
+          <a:fontRef idx="minor">
+            <a:schemeClr val="tx1"/>
+          </a:fontRef>
+        </p:style>
+      </p:cxnSp>
     </p:spTree>
     <p:extLst>
       <p:ext uri="{BB962C8B-B14F-4D97-AF65-F5344CB8AC3E}">
-        <p14:creationId xmlns:p14="http://schemas.microsoft.com/office/powerpoint/2010/main" val="2573534866"/>
+        <p14:creationId xmlns:p14="http://schemas.microsoft.com/office/powerpoint/2010/main" val="2961367456"/>
+      </p:ext>
+    </p:extLst>
+  </p:cSld>
+  <p:clrMapOvr>
+    <a:masterClrMapping/>
+  </p:clrMapOvr>
+</p:sld>
+</file>
+
+<file path=ppt/slides/slide4.xml><?xml version="1.0" encoding="utf-8"?>
+<p:sld xmlns:a="http://schemas.openxmlformats.org/drawingml/2006/main" xmlns:r="http://schemas.openxmlformats.org/officeDocument/2006/relationships" xmlns:p="http://schemas.openxmlformats.org/presentationml/2006/main">
+  <p:cSld>
+    <p:spTree>
+      <p:nvGrpSpPr>
+        <p:cNvPr id="1" name=""/>
+        <p:cNvGrpSpPr/>
+        <p:nvPr/>
+      </p:nvGrpSpPr>
+      <p:grpSpPr>
+        <a:xfrm>
+          <a:off x="0" y="0"/>
+          <a:ext cx="0" cy="0"/>
+          <a:chOff x="0" y="0"/>
+          <a:chExt cx="0" cy="0"/>
+        </a:xfrm>
+      </p:grpSpPr>
+      <p:sp>
+        <p:nvSpPr>
+          <p:cNvPr id="8" name="TextBox 7">
+            <a:extLst>
+              <a:ext uri="{FF2B5EF4-FFF2-40B4-BE49-F238E27FC236}">
+                <a16:creationId xmlns:a16="http://schemas.microsoft.com/office/drawing/2014/main" id="{B36328CF-89B9-017F-51F3-040A9719FE98}"/>
+              </a:ext>
+            </a:extLst>
+          </p:cNvPr>
+          <p:cNvSpPr txBox="1"/>
+          <p:nvPr/>
+        </p:nvSpPr>
+        <p:spPr>
+          <a:xfrm>
+            <a:off x="4484370" y="129243"/>
+            <a:ext cx="3223260" cy="1323439"/>
+          </a:xfrm>
+          <a:prstGeom prst="rect">
+            <a:avLst/>
+          </a:prstGeom>
+          <a:noFill/>
+        </p:spPr>
+        <p:txBody>
+          <a:bodyPr wrap="square">
+            <a:spAutoFit/>
+          </a:bodyPr>
+          <a:lstStyle/>
+          <a:p>
+            <a:r>
+              <a:rPr lang="en-US" sz="8000" b="1" dirty="0">
+                <a:latin typeface="Times New Roman" panose="02020603050405020304" pitchFamily="18" charset="0"/>
+                <a:cs typeface="Times New Roman" panose="02020603050405020304" pitchFamily="18" charset="0"/>
+              </a:rPr>
+              <a:t>Step 2:</a:t>
+            </a:r>
+            <a:endParaRPr lang="en-US" sz="1400" dirty="0"/>
+          </a:p>
+        </p:txBody>
+      </p:sp>
+      <p:sp>
+        <p:nvSpPr>
+          <p:cNvPr id="9" name="TextBox 8">
+            <a:extLst>
+              <a:ext uri="{FF2B5EF4-FFF2-40B4-BE49-F238E27FC236}">
+                <a16:creationId xmlns:a16="http://schemas.microsoft.com/office/drawing/2014/main" id="{290DFA55-1975-7D67-D439-2F9ECD0CDA02}"/>
+              </a:ext>
+            </a:extLst>
+          </p:cNvPr>
+          <p:cNvSpPr txBox="1"/>
+          <p:nvPr/>
+        </p:nvSpPr>
+        <p:spPr>
+          <a:xfrm>
+            <a:off x="4379323" y="1492200"/>
+            <a:ext cx="7175368" cy="523220"/>
+          </a:xfrm>
+          <a:prstGeom prst="rect">
+            <a:avLst/>
+          </a:prstGeom>
+          <a:noFill/>
+        </p:spPr>
+        <p:txBody>
+          <a:bodyPr wrap="square">
+            <a:spAutoFit/>
+          </a:bodyPr>
+          <a:lstStyle/>
+          <a:p>
+            <a:r>
+              <a:rPr lang="en-US" sz="2800" b="1" dirty="0">
+                <a:latin typeface="Times New Roman" panose="02020603050405020304" pitchFamily="18" charset="0"/>
+                <a:cs typeface="Times New Roman" panose="02020603050405020304" pitchFamily="18" charset="0"/>
+              </a:rPr>
+              <a:t>Break traders into </a:t>
+            </a:r>
+            <a:r>
+              <a:rPr lang="en-US" sz="2800" b="1" i="1" dirty="0">
+                <a:latin typeface="Times New Roman" panose="02020603050405020304" pitchFamily="18" charset="0"/>
+                <a:cs typeface="Times New Roman" panose="02020603050405020304" pitchFamily="18" charset="0"/>
+              </a:rPr>
+              <a:t>n</a:t>
+            </a:r>
+            <a:r>
+              <a:rPr lang="en-US" sz="2800" b="1" dirty="0">
+                <a:latin typeface="Times New Roman" panose="02020603050405020304" pitchFamily="18" charset="0"/>
+                <a:cs typeface="Times New Roman" panose="02020603050405020304" pitchFamily="18" charset="0"/>
+              </a:rPr>
+              <a:t> brackets</a:t>
+            </a:r>
+            <a:endParaRPr lang="en-US" sz="2800" dirty="0"/>
+          </a:p>
+        </p:txBody>
+      </p:sp>
+      <p:pic>
+        <p:nvPicPr>
+          <p:cNvPr id="3" name="Picture 2">
+            <a:extLst>
+              <a:ext uri="{FF2B5EF4-FFF2-40B4-BE49-F238E27FC236}">
+                <a16:creationId xmlns:a16="http://schemas.microsoft.com/office/drawing/2014/main" id="{94A7170F-A0B8-0F91-8578-A7A7C78B3360}"/>
+              </a:ext>
+            </a:extLst>
+          </p:cNvPr>
+          <p:cNvPicPr>
+            <a:picLocks noChangeAspect="1"/>
+          </p:cNvPicPr>
+          <p:nvPr/>
+        </p:nvPicPr>
+        <p:blipFill>
+          <a:blip r:embed="rId3"/>
+          <a:stretch>
+            <a:fillRect/>
+          </a:stretch>
+        </p:blipFill>
+        <p:spPr>
+          <a:xfrm>
+            <a:off x="710189" y="176747"/>
+            <a:ext cx="3372283" cy="6504505"/>
+          </a:xfrm>
+          <a:prstGeom prst="rect">
+            <a:avLst/>
+          </a:prstGeom>
+        </p:spPr>
+      </p:pic>
+      <p:sp>
+        <p:nvSpPr>
+          <p:cNvPr id="4" name="TextBox 3">
+            <a:extLst>
+              <a:ext uri="{FF2B5EF4-FFF2-40B4-BE49-F238E27FC236}">
+                <a16:creationId xmlns:a16="http://schemas.microsoft.com/office/drawing/2014/main" id="{B31A88D4-9D3F-CB73-4B86-9E69AD48CB79}"/>
+              </a:ext>
+            </a:extLst>
+          </p:cNvPr>
+          <p:cNvSpPr txBox="1"/>
+          <p:nvPr/>
+        </p:nvSpPr>
+        <p:spPr>
+          <a:xfrm rot="16200000">
+            <a:off x="-396884" y="1108931"/>
+            <a:ext cx="1620445" cy="400110"/>
+          </a:xfrm>
+          <a:prstGeom prst="rect">
+            <a:avLst/>
+          </a:prstGeom>
+          <a:noFill/>
+        </p:spPr>
+        <p:txBody>
+          <a:bodyPr wrap="square">
+            <a:spAutoFit/>
+          </a:bodyPr>
+          <a:lstStyle/>
+          <a:p>
+            <a:pPr algn="ctr"/>
+            <a:r>
+              <a:rPr lang="en-US" sz="2000" b="1" dirty="0">
+                <a:latin typeface="Times New Roman" panose="02020603050405020304" pitchFamily="18" charset="0"/>
+                <a:cs typeface="Times New Roman" panose="02020603050405020304" pitchFamily="18" charset="0"/>
+              </a:rPr>
+              <a:t>1</a:t>
+            </a:r>
+            <a:r>
+              <a:rPr lang="en-US" sz="2000" b="1" baseline="30000" dirty="0">
+                <a:latin typeface="Times New Roman" panose="02020603050405020304" pitchFamily="18" charset="0"/>
+                <a:cs typeface="Times New Roman" panose="02020603050405020304" pitchFamily="18" charset="0"/>
+              </a:rPr>
+              <a:t>st</a:t>
+            </a:r>
+            <a:r>
+              <a:rPr lang="en-US" sz="2000" b="1" dirty="0">
+                <a:latin typeface="Times New Roman" panose="02020603050405020304" pitchFamily="18" charset="0"/>
+                <a:cs typeface="Times New Roman" panose="02020603050405020304" pitchFamily="18" charset="0"/>
+              </a:rPr>
+              <a:t> Bracket</a:t>
+            </a:r>
+            <a:endParaRPr lang="en-US" sz="2000" dirty="0"/>
+          </a:p>
+        </p:txBody>
+      </p:sp>
+      <p:sp>
+        <p:nvSpPr>
+          <p:cNvPr id="6" name="TextBox 5">
+            <a:extLst>
+              <a:ext uri="{FF2B5EF4-FFF2-40B4-BE49-F238E27FC236}">
+                <a16:creationId xmlns:a16="http://schemas.microsoft.com/office/drawing/2014/main" id="{0EAC8A0D-2119-1063-58AD-EB9955633C75}"/>
+              </a:ext>
+            </a:extLst>
+          </p:cNvPr>
+          <p:cNvSpPr txBox="1"/>
+          <p:nvPr/>
+        </p:nvSpPr>
+        <p:spPr>
+          <a:xfrm rot="16200000">
+            <a:off x="-396883" y="3228944"/>
+            <a:ext cx="1620445" cy="400110"/>
+          </a:xfrm>
+          <a:prstGeom prst="rect">
+            <a:avLst/>
+          </a:prstGeom>
+          <a:noFill/>
+        </p:spPr>
+        <p:txBody>
+          <a:bodyPr wrap="square">
+            <a:spAutoFit/>
+          </a:bodyPr>
+          <a:lstStyle/>
+          <a:p>
+            <a:pPr algn="ctr"/>
+            <a:r>
+              <a:rPr lang="en-US" sz="2000" b="1" dirty="0">
+                <a:latin typeface="Times New Roman" panose="02020603050405020304" pitchFamily="18" charset="0"/>
+                <a:cs typeface="Times New Roman" panose="02020603050405020304" pitchFamily="18" charset="0"/>
+              </a:rPr>
+              <a:t>2</a:t>
+            </a:r>
+            <a:r>
+              <a:rPr lang="en-US" sz="2000" b="1" baseline="30000" dirty="0">
+                <a:latin typeface="Times New Roman" panose="02020603050405020304" pitchFamily="18" charset="0"/>
+                <a:cs typeface="Times New Roman" panose="02020603050405020304" pitchFamily="18" charset="0"/>
+              </a:rPr>
+              <a:t>nd</a:t>
+            </a:r>
+            <a:r>
+              <a:rPr lang="en-US" sz="2000" b="1" dirty="0">
+                <a:latin typeface="Times New Roman" panose="02020603050405020304" pitchFamily="18" charset="0"/>
+                <a:cs typeface="Times New Roman" panose="02020603050405020304" pitchFamily="18" charset="0"/>
+              </a:rPr>
+              <a:t> Bracket</a:t>
+            </a:r>
+            <a:endParaRPr lang="en-US" sz="2000" dirty="0"/>
+          </a:p>
+        </p:txBody>
+      </p:sp>
+      <p:sp>
+        <p:nvSpPr>
+          <p:cNvPr id="10" name="TextBox 9">
+            <a:extLst>
+              <a:ext uri="{FF2B5EF4-FFF2-40B4-BE49-F238E27FC236}">
+                <a16:creationId xmlns:a16="http://schemas.microsoft.com/office/drawing/2014/main" id="{BF8CAF08-2F10-42A4-50DE-832397B7390F}"/>
+              </a:ext>
+            </a:extLst>
+          </p:cNvPr>
+          <p:cNvSpPr txBox="1"/>
+          <p:nvPr/>
+        </p:nvSpPr>
+        <p:spPr>
+          <a:xfrm rot="16200000">
+            <a:off x="-396885" y="5468764"/>
+            <a:ext cx="1620445" cy="400110"/>
+          </a:xfrm>
+          <a:prstGeom prst="rect">
+            <a:avLst/>
+          </a:prstGeom>
+          <a:noFill/>
+        </p:spPr>
+        <p:txBody>
+          <a:bodyPr wrap="square">
+            <a:spAutoFit/>
+          </a:bodyPr>
+          <a:lstStyle/>
+          <a:p>
+            <a:pPr algn="ctr"/>
+            <a:r>
+              <a:rPr lang="en-US" sz="2000" b="1" i="1" dirty="0">
+                <a:latin typeface="Times New Roman" panose="02020603050405020304" pitchFamily="18" charset="0"/>
+                <a:cs typeface="Times New Roman" panose="02020603050405020304" pitchFamily="18" charset="0"/>
+              </a:rPr>
+              <a:t>nth</a:t>
+            </a:r>
+            <a:r>
+              <a:rPr lang="en-US" sz="2000" b="1" dirty="0">
+                <a:latin typeface="Times New Roman" panose="02020603050405020304" pitchFamily="18" charset="0"/>
+                <a:cs typeface="Times New Roman" panose="02020603050405020304" pitchFamily="18" charset="0"/>
+              </a:rPr>
+              <a:t> Bracket</a:t>
+            </a:r>
+            <a:endParaRPr lang="en-US" sz="2000" dirty="0"/>
+          </a:p>
+        </p:txBody>
+      </p:sp>
+    </p:spTree>
+    <p:extLst>
+      <p:ext uri="{BB962C8B-B14F-4D97-AF65-F5344CB8AC3E}">
+        <p14:creationId xmlns:p14="http://schemas.microsoft.com/office/powerpoint/2010/main" val="2693527550"/>
+      </p:ext>
+    </p:extLst>
+  </p:cSld>
+  <p:clrMapOvr>
+    <a:masterClrMapping/>
+  </p:clrMapOvr>
+</p:sld>
+</file>
+
+<file path=ppt/slides/slide5.xml><?xml version="1.0" encoding="utf-8"?>
+<p:sld xmlns:a="http://schemas.openxmlformats.org/drawingml/2006/main" xmlns:r="http://schemas.openxmlformats.org/officeDocument/2006/relationships" xmlns:p="http://schemas.openxmlformats.org/presentationml/2006/main">
+  <p:cSld>
+    <p:spTree>
+      <p:nvGrpSpPr>
+        <p:cNvPr id="1" name=""/>
+        <p:cNvGrpSpPr/>
+        <p:nvPr/>
+      </p:nvGrpSpPr>
+      <p:grpSpPr>
+        <a:xfrm>
+          <a:off x="0" y="0"/>
+          <a:ext cx="0" cy="0"/>
+          <a:chOff x="0" y="0"/>
+          <a:chExt cx="0" cy="0"/>
+        </a:xfrm>
+      </p:grpSpPr>
+      <p:sp>
+        <p:nvSpPr>
+          <p:cNvPr id="8" name="TextBox 7">
+            <a:extLst>
+              <a:ext uri="{FF2B5EF4-FFF2-40B4-BE49-F238E27FC236}">
+                <a16:creationId xmlns:a16="http://schemas.microsoft.com/office/drawing/2014/main" id="{B36328CF-89B9-017F-51F3-040A9719FE98}"/>
+              </a:ext>
+            </a:extLst>
+          </p:cNvPr>
+          <p:cNvSpPr txBox="1"/>
+          <p:nvPr/>
+        </p:nvSpPr>
+        <p:spPr>
+          <a:xfrm>
+            <a:off x="4484370" y="129243"/>
+            <a:ext cx="3223260" cy="1323439"/>
+          </a:xfrm>
+          <a:prstGeom prst="rect">
+            <a:avLst/>
+          </a:prstGeom>
+          <a:noFill/>
+        </p:spPr>
+        <p:txBody>
+          <a:bodyPr wrap="square">
+            <a:spAutoFit/>
+          </a:bodyPr>
+          <a:lstStyle/>
+          <a:p>
+            <a:r>
+              <a:rPr lang="en-US" sz="8000" b="1" dirty="0">
+                <a:latin typeface="Times New Roman" panose="02020603050405020304" pitchFamily="18" charset="0"/>
+                <a:cs typeface="Times New Roman" panose="02020603050405020304" pitchFamily="18" charset="0"/>
+              </a:rPr>
+              <a:t>Step 3:</a:t>
+            </a:r>
+            <a:endParaRPr lang="en-US" sz="1400" dirty="0"/>
+          </a:p>
+        </p:txBody>
+      </p:sp>
+      <p:sp>
+        <p:nvSpPr>
+          <p:cNvPr id="9" name="TextBox 8">
+            <a:extLst>
+              <a:ext uri="{FF2B5EF4-FFF2-40B4-BE49-F238E27FC236}">
+                <a16:creationId xmlns:a16="http://schemas.microsoft.com/office/drawing/2014/main" id="{290DFA55-1975-7D67-D439-2F9ECD0CDA02}"/>
+              </a:ext>
+            </a:extLst>
+          </p:cNvPr>
+          <p:cNvSpPr txBox="1"/>
+          <p:nvPr/>
+        </p:nvSpPr>
+        <p:spPr>
+          <a:xfrm>
+            <a:off x="4379323" y="1492200"/>
+            <a:ext cx="5817622" cy="954107"/>
+          </a:xfrm>
+          <a:prstGeom prst="rect">
+            <a:avLst/>
+          </a:prstGeom>
+          <a:noFill/>
+        </p:spPr>
+        <p:txBody>
+          <a:bodyPr wrap="square">
+            <a:spAutoFit/>
+          </a:bodyPr>
+          <a:lstStyle/>
+          <a:p>
+            <a:r>
+              <a:rPr lang="en-US" sz="2800" b="1" dirty="0">
+                <a:latin typeface="Times New Roman" panose="02020603050405020304" pitchFamily="18" charset="0"/>
+                <a:cs typeface="Times New Roman" panose="02020603050405020304" pitchFamily="18" charset="0"/>
+              </a:rPr>
+              <a:t>Sort by Sharpe (decreasing) </a:t>
+            </a:r>
+            <a:r>
+              <a:rPr lang="en-US" sz="2800" b="1" i="1" dirty="0">
+                <a:latin typeface="Times New Roman" panose="02020603050405020304" pitchFamily="18" charset="0"/>
+                <a:cs typeface="Times New Roman" panose="02020603050405020304" pitchFamily="18" charset="0"/>
+              </a:rPr>
+              <a:t>within </a:t>
+            </a:r>
+            <a:r>
+              <a:rPr lang="en-US" sz="2800" b="1" dirty="0">
+                <a:latin typeface="Times New Roman" panose="02020603050405020304" pitchFamily="18" charset="0"/>
+                <a:cs typeface="Times New Roman" panose="02020603050405020304" pitchFamily="18" charset="0"/>
+              </a:rPr>
+              <a:t>each bracket</a:t>
+            </a:r>
+            <a:endParaRPr lang="en-US" sz="2800" dirty="0"/>
+          </a:p>
+        </p:txBody>
+      </p:sp>
+      <p:sp>
+        <p:nvSpPr>
+          <p:cNvPr id="4" name="TextBox 3">
+            <a:extLst>
+              <a:ext uri="{FF2B5EF4-FFF2-40B4-BE49-F238E27FC236}">
+                <a16:creationId xmlns:a16="http://schemas.microsoft.com/office/drawing/2014/main" id="{B31A88D4-9D3F-CB73-4B86-9E69AD48CB79}"/>
+              </a:ext>
+            </a:extLst>
+          </p:cNvPr>
+          <p:cNvSpPr txBox="1"/>
+          <p:nvPr/>
+        </p:nvSpPr>
+        <p:spPr>
+          <a:xfrm rot="16200000">
+            <a:off x="-396884" y="1108931"/>
+            <a:ext cx="1620445" cy="400110"/>
+          </a:xfrm>
+          <a:prstGeom prst="rect">
+            <a:avLst/>
+          </a:prstGeom>
+          <a:noFill/>
+        </p:spPr>
+        <p:txBody>
+          <a:bodyPr wrap="square">
+            <a:spAutoFit/>
+          </a:bodyPr>
+          <a:lstStyle/>
+          <a:p>
+            <a:pPr algn="ctr"/>
+            <a:r>
+              <a:rPr lang="en-US" sz="2000" b="1" dirty="0">
+                <a:latin typeface="Times New Roman" panose="02020603050405020304" pitchFamily="18" charset="0"/>
+                <a:cs typeface="Times New Roman" panose="02020603050405020304" pitchFamily="18" charset="0"/>
+              </a:rPr>
+              <a:t>1</a:t>
+            </a:r>
+            <a:r>
+              <a:rPr lang="en-US" sz="2000" b="1" baseline="30000" dirty="0">
+                <a:latin typeface="Times New Roman" panose="02020603050405020304" pitchFamily="18" charset="0"/>
+                <a:cs typeface="Times New Roman" panose="02020603050405020304" pitchFamily="18" charset="0"/>
+              </a:rPr>
+              <a:t>st</a:t>
+            </a:r>
+            <a:r>
+              <a:rPr lang="en-US" sz="2000" b="1" dirty="0">
+                <a:latin typeface="Times New Roman" panose="02020603050405020304" pitchFamily="18" charset="0"/>
+                <a:cs typeface="Times New Roman" panose="02020603050405020304" pitchFamily="18" charset="0"/>
+              </a:rPr>
+              <a:t> Bracket</a:t>
+            </a:r>
+            <a:endParaRPr lang="en-US" sz="2000" dirty="0"/>
+          </a:p>
+        </p:txBody>
+      </p:sp>
+      <p:sp>
+        <p:nvSpPr>
+          <p:cNvPr id="6" name="TextBox 5">
+            <a:extLst>
+              <a:ext uri="{FF2B5EF4-FFF2-40B4-BE49-F238E27FC236}">
+                <a16:creationId xmlns:a16="http://schemas.microsoft.com/office/drawing/2014/main" id="{0EAC8A0D-2119-1063-58AD-EB9955633C75}"/>
+              </a:ext>
+            </a:extLst>
+          </p:cNvPr>
+          <p:cNvSpPr txBox="1"/>
+          <p:nvPr/>
+        </p:nvSpPr>
+        <p:spPr>
+          <a:xfrm rot="16200000">
+            <a:off x="-396883" y="3228944"/>
+            <a:ext cx="1620445" cy="400110"/>
+          </a:xfrm>
+          <a:prstGeom prst="rect">
+            <a:avLst/>
+          </a:prstGeom>
+          <a:noFill/>
+        </p:spPr>
+        <p:txBody>
+          <a:bodyPr wrap="square">
+            <a:spAutoFit/>
+          </a:bodyPr>
+          <a:lstStyle/>
+          <a:p>
+            <a:pPr algn="ctr"/>
+            <a:r>
+              <a:rPr lang="en-US" sz="2000" b="1" dirty="0">
+                <a:latin typeface="Times New Roman" panose="02020603050405020304" pitchFamily="18" charset="0"/>
+                <a:cs typeface="Times New Roman" panose="02020603050405020304" pitchFamily="18" charset="0"/>
+              </a:rPr>
+              <a:t>2</a:t>
+            </a:r>
+            <a:r>
+              <a:rPr lang="en-US" sz="2000" b="1" baseline="30000" dirty="0">
+                <a:latin typeface="Times New Roman" panose="02020603050405020304" pitchFamily="18" charset="0"/>
+                <a:cs typeface="Times New Roman" panose="02020603050405020304" pitchFamily="18" charset="0"/>
+              </a:rPr>
+              <a:t>nd</a:t>
+            </a:r>
+            <a:r>
+              <a:rPr lang="en-US" sz="2000" b="1" dirty="0">
+                <a:latin typeface="Times New Roman" panose="02020603050405020304" pitchFamily="18" charset="0"/>
+                <a:cs typeface="Times New Roman" panose="02020603050405020304" pitchFamily="18" charset="0"/>
+              </a:rPr>
+              <a:t> Bracket</a:t>
+            </a:r>
+            <a:endParaRPr lang="en-US" sz="2000" dirty="0"/>
+          </a:p>
+        </p:txBody>
+      </p:sp>
+      <p:sp>
+        <p:nvSpPr>
+          <p:cNvPr id="10" name="TextBox 9">
+            <a:extLst>
+              <a:ext uri="{FF2B5EF4-FFF2-40B4-BE49-F238E27FC236}">
+                <a16:creationId xmlns:a16="http://schemas.microsoft.com/office/drawing/2014/main" id="{BF8CAF08-2F10-42A4-50DE-832397B7390F}"/>
+              </a:ext>
+            </a:extLst>
+          </p:cNvPr>
+          <p:cNvSpPr txBox="1"/>
+          <p:nvPr/>
+        </p:nvSpPr>
+        <p:spPr>
+          <a:xfrm rot="16200000">
+            <a:off x="-396885" y="5468764"/>
+            <a:ext cx="1620445" cy="400110"/>
+          </a:xfrm>
+          <a:prstGeom prst="rect">
+            <a:avLst/>
+          </a:prstGeom>
+          <a:noFill/>
+        </p:spPr>
+        <p:txBody>
+          <a:bodyPr wrap="square">
+            <a:spAutoFit/>
+          </a:bodyPr>
+          <a:lstStyle/>
+          <a:p>
+            <a:pPr algn="ctr"/>
+            <a:r>
+              <a:rPr lang="en-US" sz="2000" b="1" i="1" dirty="0">
+                <a:latin typeface="Times New Roman" panose="02020603050405020304" pitchFamily="18" charset="0"/>
+                <a:cs typeface="Times New Roman" panose="02020603050405020304" pitchFamily="18" charset="0"/>
+              </a:rPr>
+              <a:t>nth</a:t>
+            </a:r>
+            <a:r>
+              <a:rPr lang="en-US" sz="2000" b="1" dirty="0">
+                <a:latin typeface="Times New Roman" panose="02020603050405020304" pitchFamily="18" charset="0"/>
+                <a:cs typeface="Times New Roman" panose="02020603050405020304" pitchFamily="18" charset="0"/>
+              </a:rPr>
+              <a:t> Bracket</a:t>
+            </a:r>
+            <a:endParaRPr lang="en-US" sz="2000" dirty="0"/>
+          </a:p>
+        </p:txBody>
+      </p:sp>
+      <p:pic>
+        <p:nvPicPr>
+          <p:cNvPr id="5" name="Picture 4">
+            <a:extLst>
+              <a:ext uri="{FF2B5EF4-FFF2-40B4-BE49-F238E27FC236}">
+                <a16:creationId xmlns:a16="http://schemas.microsoft.com/office/drawing/2014/main" id="{EA93FC53-CE21-5BB3-39C3-E4652E61EF5F}"/>
+              </a:ext>
+            </a:extLst>
+          </p:cNvPr>
+          <p:cNvPicPr>
+            <a:picLocks noChangeAspect="1"/>
+          </p:cNvPicPr>
+          <p:nvPr/>
+        </p:nvPicPr>
+        <p:blipFill>
+          <a:blip r:embed="rId3"/>
+          <a:stretch>
+            <a:fillRect/>
+          </a:stretch>
+        </p:blipFill>
+        <p:spPr>
+          <a:xfrm>
+            <a:off x="666838" y="452583"/>
+            <a:ext cx="3223260" cy="6101556"/>
+          </a:xfrm>
+          <a:prstGeom prst="rect">
+            <a:avLst/>
+          </a:prstGeom>
+        </p:spPr>
+      </p:pic>
+      <p:cxnSp>
+        <p:nvCxnSpPr>
+          <p:cNvPr id="7" name="Straight Arrow Connector 6">
+            <a:extLst>
+              <a:ext uri="{FF2B5EF4-FFF2-40B4-BE49-F238E27FC236}">
+                <a16:creationId xmlns:a16="http://schemas.microsoft.com/office/drawing/2014/main" id="{5ABCA8CA-30F2-4DCF-AFB8-1980955AEE54}"/>
+              </a:ext>
+            </a:extLst>
+          </p:cNvPr>
+          <p:cNvCxnSpPr>
+            <a:cxnSpLocks/>
+          </p:cNvCxnSpPr>
+          <p:nvPr/>
+        </p:nvCxnSpPr>
+        <p:spPr>
+          <a:xfrm>
+            <a:off x="2909455" y="354221"/>
+            <a:ext cx="0" cy="2086089"/>
+          </a:xfrm>
+          <a:prstGeom prst="straightConnector1">
+            <a:avLst/>
+          </a:prstGeom>
+          <a:ln w="41275">
+            <a:solidFill>
+              <a:srgbClr val="FF0000"/>
+            </a:solidFill>
+            <a:tailEnd type="triangle" w="lg" len="lg"/>
+          </a:ln>
+        </p:spPr>
+        <p:style>
+          <a:lnRef idx="1">
+            <a:schemeClr val="accent1"/>
+          </a:lnRef>
+          <a:fillRef idx="0">
+            <a:schemeClr val="accent1"/>
+          </a:fillRef>
+          <a:effectRef idx="0">
+            <a:schemeClr val="accent1"/>
+          </a:effectRef>
+          <a:fontRef idx="minor">
+            <a:schemeClr val="tx1"/>
+          </a:fontRef>
+        </p:style>
+      </p:cxnSp>
+      <p:cxnSp>
+        <p:nvCxnSpPr>
+          <p:cNvPr id="13" name="Straight Arrow Connector 12">
+            <a:extLst>
+              <a:ext uri="{FF2B5EF4-FFF2-40B4-BE49-F238E27FC236}">
+                <a16:creationId xmlns:a16="http://schemas.microsoft.com/office/drawing/2014/main" id="{827EB42D-706C-8E09-2672-A6D33B314E82}"/>
+              </a:ext>
+            </a:extLst>
+          </p:cNvPr>
+          <p:cNvCxnSpPr>
+            <a:cxnSpLocks/>
+          </p:cNvCxnSpPr>
+          <p:nvPr/>
+        </p:nvCxnSpPr>
+        <p:spPr>
+          <a:xfrm>
+            <a:off x="2909455" y="2495726"/>
+            <a:ext cx="0" cy="2086089"/>
+          </a:xfrm>
+          <a:prstGeom prst="straightConnector1">
+            <a:avLst/>
+          </a:prstGeom>
+          <a:ln w="41275">
+            <a:solidFill>
+              <a:srgbClr val="FF0000"/>
+            </a:solidFill>
+            <a:tailEnd type="triangle" w="lg" len="lg"/>
+          </a:ln>
+        </p:spPr>
+        <p:style>
+          <a:lnRef idx="1">
+            <a:schemeClr val="accent1"/>
+          </a:lnRef>
+          <a:fillRef idx="0">
+            <a:schemeClr val="accent1"/>
+          </a:fillRef>
+          <a:effectRef idx="0">
+            <a:schemeClr val="accent1"/>
+          </a:effectRef>
+          <a:fontRef idx="minor">
+            <a:schemeClr val="tx1"/>
+          </a:fontRef>
+        </p:style>
+      </p:cxnSp>
+      <p:cxnSp>
+        <p:nvCxnSpPr>
+          <p:cNvPr id="14" name="Straight Arrow Connector 13">
+            <a:extLst>
+              <a:ext uri="{FF2B5EF4-FFF2-40B4-BE49-F238E27FC236}">
+                <a16:creationId xmlns:a16="http://schemas.microsoft.com/office/drawing/2014/main" id="{4EC668DC-D1D5-BB59-FCDC-D02D1BD7E64B}"/>
+              </a:ext>
+            </a:extLst>
+          </p:cNvPr>
+          <p:cNvCxnSpPr>
+            <a:cxnSpLocks/>
+          </p:cNvCxnSpPr>
+          <p:nvPr/>
+        </p:nvCxnSpPr>
+        <p:spPr>
+          <a:xfrm>
+            <a:off x="2909455" y="4689362"/>
+            <a:ext cx="0" cy="2086089"/>
+          </a:xfrm>
+          <a:prstGeom prst="straightConnector1">
+            <a:avLst/>
+          </a:prstGeom>
+          <a:ln w="41275">
+            <a:solidFill>
+              <a:srgbClr val="FF0000"/>
+            </a:solidFill>
+            <a:tailEnd type="triangle" w="lg" len="lg"/>
+          </a:ln>
+        </p:spPr>
+        <p:style>
+          <a:lnRef idx="1">
+            <a:schemeClr val="accent1"/>
+          </a:lnRef>
+          <a:fillRef idx="0">
+            <a:schemeClr val="accent1"/>
+          </a:fillRef>
+          <a:effectRef idx="0">
+            <a:schemeClr val="accent1"/>
+          </a:effectRef>
+          <a:fontRef idx="minor">
+            <a:schemeClr val="tx1"/>
+          </a:fontRef>
+        </p:style>
+      </p:cxnSp>
+    </p:spTree>
+    <p:extLst>
+      <p:ext uri="{BB962C8B-B14F-4D97-AF65-F5344CB8AC3E}">
+        <p14:creationId xmlns:p14="http://schemas.microsoft.com/office/powerpoint/2010/main" val="1391937590"/>
+      </p:ext>
+    </p:extLst>
+  </p:cSld>
+  <p:clrMapOvr>
+    <a:masterClrMapping/>
+  </p:clrMapOvr>
+</p:sld>
+</file>
+
+<file path=ppt/slides/slide6.xml><?xml version="1.0" encoding="utf-8"?>
+<p:sld xmlns:a="http://schemas.openxmlformats.org/drawingml/2006/main" xmlns:r="http://schemas.openxmlformats.org/officeDocument/2006/relationships" xmlns:p="http://schemas.openxmlformats.org/presentationml/2006/main">
+  <p:cSld>
+    <p:spTree>
+      <p:nvGrpSpPr>
+        <p:cNvPr id="1" name=""/>
+        <p:cNvGrpSpPr/>
+        <p:nvPr/>
+      </p:nvGrpSpPr>
+      <p:grpSpPr>
+        <a:xfrm>
+          <a:off x="0" y="0"/>
+          <a:ext cx="0" cy="0"/>
+          <a:chOff x="0" y="0"/>
+          <a:chExt cx="0" cy="0"/>
+        </a:xfrm>
+      </p:grpSpPr>
+      <p:sp>
+        <p:nvSpPr>
+          <p:cNvPr id="8" name="TextBox 7">
+            <a:extLst>
+              <a:ext uri="{FF2B5EF4-FFF2-40B4-BE49-F238E27FC236}">
+                <a16:creationId xmlns:a16="http://schemas.microsoft.com/office/drawing/2014/main" id="{B36328CF-89B9-017F-51F3-040A9719FE98}"/>
+              </a:ext>
+            </a:extLst>
+          </p:cNvPr>
+          <p:cNvSpPr txBox="1"/>
+          <p:nvPr/>
+        </p:nvSpPr>
+        <p:spPr>
+          <a:xfrm>
+            <a:off x="5144247" y="91535"/>
+            <a:ext cx="3223260" cy="1323439"/>
+          </a:xfrm>
+          <a:prstGeom prst="rect">
+            <a:avLst/>
+          </a:prstGeom>
+          <a:noFill/>
+        </p:spPr>
+        <p:txBody>
+          <a:bodyPr wrap="square">
+            <a:spAutoFit/>
+          </a:bodyPr>
+          <a:lstStyle/>
+          <a:p>
+            <a:r>
+              <a:rPr lang="en-US" sz="8000" b="1" dirty="0">
+                <a:latin typeface="Times New Roman" panose="02020603050405020304" pitchFamily="18" charset="0"/>
+                <a:cs typeface="Times New Roman" panose="02020603050405020304" pitchFamily="18" charset="0"/>
+              </a:rPr>
+              <a:t>Step 4:</a:t>
+            </a:r>
+            <a:endParaRPr lang="en-US" sz="1400" dirty="0"/>
+          </a:p>
+        </p:txBody>
+      </p:sp>
+      <p:sp>
+        <p:nvSpPr>
+          <p:cNvPr id="9" name="TextBox 8">
+            <a:extLst>
+              <a:ext uri="{FF2B5EF4-FFF2-40B4-BE49-F238E27FC236}">
+                <a16:creationId xmlns:a16="http://schemas.microsoft.com/office/drawing/2014/main" id="{290DFA55-1975-7D67-D439-2F9ECD0CDA02}"/>
+              </a:ext>
+            </a:extLst>
+          </p:cNvPr>
+          <p:cNvSpPr txBox="1"/>
+          <p:nvPr/>
+        </p:nvSpPr>
+        <p:spPr>
+          <a:xfrm>
+            <a:off x="5039200" y="1454492"/>
+            <a:ext cx="5817622" cy="954107"/>
+          </a:xfrm>
+          <a:prstGeom prst="rect">
+            <a:avLst/>
+          </a:prstGeom>
+          <a:noFill/>
+        </p:spPr>
+        <p:txBody>
+          <a:bodyPr wrap="square">
+            <a:spAutoFit/>
+          </a:bodyPr>
+          <a:lstStyle/>
+          <a:p>
+            <a:r>
+              <a:rPr lang="en-US" sz="2800" b="1" dirty="0">
+                <a:latin typeface="Times New Roman" panose="02020603050405020304" pitchFamily="18" charset="0"/>
+                <a:cs typeface="Times New Roman" panose="02020603050405020304" pitchFamily="18" charset="0"/>
+              </a:rPr>
+              <a:t>Assign ranks within brackets </a:t>
+            </a:r>
+          </a:p>
+          <a:p>
+            <a:r>
+              <a:rPr lang="en-US" sz="2800" b="1" dirty="0">
+                <a:latin typeface="Times New Roman" panose="02020603050405020304" pitchFamily="18" charset="0"/>
+                <a:cs typeface="Times New Roman" panose="02020603050405020304" pitchFamily="18" charset="0"/>
+              </a:rPr>
+              <a:t>(your “bracket rank”)</a:t>
+            </a:r>
+            <a:endParaRPr lang="en-US" sz="2800" dirty="0"/>
+          </a:p>
+        </p:txBody>
+      </p:sp>
+      <p:pic>
+        <p:nvPicPr>
+          <p:cNvPr id="3" name="Picture 2">
+            <a:extLst>
+              <a:ext uri="{FF2B5EF4-FFF2-40B4-BE49-F238E27FC236}">
+                <a16:creationId xmlns:a16="http://schemas.microsoft.com/office/drawing/2014/main" id="{8F373ADB-5F38-3D8A-B9FC-B15A7C0DBEB4}"/>
+              </a:ext>
+            </a:extLst>
+          </p:cNvPr>
+          <p:cNvPicPr>
+            <a:picLocks noChangeAspect="1"/>
+          </p:cNvPicPr>
+          <p:nvPr/>
+        </p:nvPicPr>
+        <p:blipFill>
+          <a:blip r:embed="rId3"/>
+          <a:stretch>
+            <a:fillRect/>
+          </a:stretch>
+        </p:blipFill>
+        <p:spPr>
+          <a:xfrm>
+            <a:off x="729555" y="318547"/>
+            <a:ext cx="4205949" cy="6063399"/>
+          </a:xfrm>
+          <a:prstGeom prst="rect">
+            <a:avLst/>
+          </a:prstGeom>
+        </p:spPr>
+      </p:pic>
+      <p:sp>
+        <p:nvSpPr>
+          <p:cNvPr id="11" name="TextBox 10">
+            <a:extLst>
+              <a:ext uri="{FF2B5EF4-FFF2-40B4-BE49-F238E27FC236}">
+                <a16:creationId xmlns:a16="http://schemas.microsoft.com/office/drawing/2014/main" id="{50B225AD-DF27-0F5E-DA70-F2F16A7410C3}"/>
+              </a:ext>
+            </a:extLst>
+          </p:cNvPr>
+          <p:cNvSpPr txBox="1"/>
+          <p:nvPr/>
+        </p:nvSpPr>
+        <p:spPr>
+          <a:xfrm rot="16200000">
+            <a:off x="-396884" y="1108931"/>
+            <a:ext cx="1620445" cy="400110"/>
+          </a:xfrm>
+          <a:prstGeom prst="rect">
+            <a:avLst/>
+          </a:prstGeom>
+          <a:noFill/>
+        </p:spPr>
+        <p:txBody>
+          <a:bodyPr wrap="square">
+            <a:spAutoFit/>
+          </a:bodyPr>
+          <a:lstStyle/>
+          <a:p>
+            <a:pPr algn="ctr"/>
+            <a:r>
+              <a:rPr lang="en-US" sz="2000" b="1" dirty="0">
+                <a:latin typeface="Times New Roman" panose="02020603050405020304" pitchFamily="18" charset="0"/>
+                <a:cs typeface="Times New Roman" panose="02020603050405020304" pitchFamily="18" charset="0"/>
+              </a:rPr>
+              <a:t>1</a:t>
+            </a:r>
+            <a:r>
+              <a:rPr lang="en-US" sz="2000" b="1" baseline="30000" dirty="0">
+                <a:latin typeface="Times New Roman" panose="02020603050405020304" pitchFamily="18" charset="0"/>
+                <a:cs typeface="Times New Roman" panose="02020603050405020304" pitchFamily="18" charset="0"/>
+              </a:rPr>
+              <a:t>st</a:t>
+            </a:r>
+            <a:r>
+              <a:rPr lang="en-US" sz="2000" b="1" dirty="0">
+                <a:latin typeface="Times New Roman" panose="02020603050405020304" pitchFamily="18" charset="0"/>
+                <a:cs typeface="Times New Roman" panose="02020603050405020304" pitchFamily="18" charset="0"/>
+              </a:rPr>
+              <a:t> Bracket</a:t>
+            </a:r>
+            <a:endParaRPr lang="en-US" sz="2000" dirty="0"/>
+          </a:p>
+        </p:txBody>
+      </p:sp>
+      <p:sp>
+        <p:nvSpPr>
+          <p:cNvPr id="12" name="TextBox 11">
+            <a:extLst>
+              <a:ext uri="{FF2B5EF4-FFF2-40B4-BE49-F238E27FC236}">
+                <a16:creationId xmlns:a16="http://schemas.microsoft.com/office/drawing/2014/main" id="{CDC24CA6-1268-558B-58DC-6F935C9C2C49}"/>
+              </a:ext>
+            </a:extLst>
+          </p:cNvPr>
+          <p:cNvSpPr txBox="1"/>
+          <p:nvPr/>
+        </p:nvSpPr>
+        <p:spPr>
+          <a:xfrm rot="16200000">
+            <a:off x="-396883" y="3228944"/>
+            <a:ext cx="1620445" cy="400110"/>
+          </a:xfrm>
+          <a:prstGeom prst="rect">
+            <a:avLst/>
+          </a:prstGeom>
+          <a:noFill/>
+        </p:spPr>
+        <p:txBody>
+          <a:bodyPr wrap="square">
+            <a:spAutoFit/>
+          </a:bodyPr>
+          <a:lstStyle/>
+          <a:p>
+            <a:pPr algn="ctr"/>
+            <a:r>
+              <a:rPr lang="en-US" sz="2000" b="1" dirty="0">
+                <a:latin typeface="Times New Roman" panose="02020603050405020304" pitchFamily="18" charset="0"/>
+                <a:cs typeface="Times New Roman" panose="02020603050405020304" pitchFamily="18" charset="0"/>
+              </a:rPr>
+              <a:t>2</a:t>
+            </a:r>
+            <a:r>
+              <a:rPr lang="en-US" sz="2000" b="1" baseline="30000" dirty="0">
+                <a:latin typeface="Times New Roman" panose="02020603050405020304" pitchFamily="18" charset="0"/>
+                <a:cs typeface="Times New Roman" panose="02020603050405020304" pitchFamily="18" charset="0"/>
+              </a:rPr>
+              <a:t>nd</a:t>
+            </a:r>
+            <a:r>
+              <a:rPr lang="en-US" sz="2000" b="1" dirty="0">
+                <a:latin typeface="Times New Roman" panose="02020603050405020304" pitchFamily="18" charset="0"/>
+                <a:cs typeface="Times New Roman" panose="02020603050405020304" pitchFamily="18" charset="0"/>
+              </a:rPr>
+              <a:t> Bracket</a:t>
+            </a:r>
+            <a:endParaRPr lang="en-US" sz="2000" dirty="0"/>
+          </a:p>
+        </p:txBody>
+      </p:sp>
+      <p:sp>
+        <p:nvSpPr>
+          <p:cNvPr id="15" name="TextBox 14">
+            <a:extLst>
+              <a:ext uri="{FF2B5EF4-FFF2-40B4-BE49-F238E27FC236}">
+                <a16:creationId xmlns:a16="http://schemas.microsoft.com/office/drawing/2014/main" id="{E4091AAE-FD75-0AE7-46C4-7757DD37FF79}"/>
+              </a:ext>
+            </a:extLst>
+          </p:cNvPr>
+          <p:cNvSpPr txBox="1"/>
+          <p:nvPr/>
+        </p:nvSpPr>
+        <p:spPr>
+          <a:xfrm rot="16200000">
+            <a:off x="-402620" y="5270802"/>
+            <a:ext cx="1620445" cy="400110"/>
+          </a:xfrm>
+          <a:prstGeom prst="rect">
+            <a:avLst/>
+          </a:prstGeom>
+          <a:noFill/>
+        </p:spPr>
+        <p:txBody>
+          <a:bodyPr wrap="square">
+            <a:spAutoFit/>
+          </a:bodyPr>
+          <a:lstStyle/>
+          <a:p>
+            <a:pPr algn="ctr"/>
+            <a:r>
+              <a:rPr lang="en-US" sz="2000" b="1" i="1" dirty="0">
+                <a:latin typeface="Times New Roman" panose="02020603050405020304" pitchFamily="18" charset="0"/>
+                <a:cs typeface="Times New Roman" panose="02020603050405020304" pitchFamily="18" charset="0"/>
+              </a:rPr>
+              <a:t>nth</a:t>
+            </a:r>
+            <a:r>
+              <a:rPr lang="en-US" sz="2000" b="1" dirty="0">
+                <a:latin typeface="Times New Roman" panose="02020603050405020304" pitchFamily="18" charset="0"/>
+                <a:cs typeface="Times New Roman" panose="02020603050405020304" pitchFamily="18" charset="0"/>
+              </a:rPr>
+              <a:t> Bracket</a:t>
+            </a:r>
+            <a:endParaRPr lang="en-US" sz="2000" dirty="0"/>
+          </a:p>
+        </p:txBody>
+      </p:sp>
+    </p:spTree>
+    <p:extLst>
+      <p:ext uri="{BB962C8B-B14F-4D97-AF65-F5344CB8AC3E}">
+        <p14:creationId xmlns:p14="http://schemas.microsoft.com/office/powerpoint/2010/main" val="3025230758"/>
+      </p:ext>
+    </p:extLst>
+  </p:cSld>
+  <p:clrMapOvr>
+    <a:masterClrMapping/>
+  </p:clrMapOvr>
+</p:sld>
+</file>
+
+<file path=ppt/slides/slide7.xml><?xml version="1.0" encoding="utf-8"?>
+<p:sld xmlns:a="http://schemas.openxmlformats.org/drawingml/2006/main" xmlns:r="http://schemas.openxmlformats.org/officeDocument/2006/relationships" xmlns:p="http://schemas.openxmlformats.org/presentationml/2006/main">
+  <p:cSld>
+    <p:spTree>
+      <p:nvGrpSpPr>
+        <p:cNvPr id="1" name=""/>
+        <p:cNvGrpSpPr/>
+        <p:nvPr/>
+      </p:nvGrpSpPr>
+      <p:grpSpPr>
+        <a:xfrm>
+          <a:off x="0" y="0"/>
+          <a:ext cx="0" cy="0"/>
+          <a:chOff x="0" y="0"/>
+          <a:chExt cx="0" cy="0"/>
+        </a:xfrm>
+      </p:grpSpPr>
+      <p:sp>
+        <p:nvSpPr>
+          <p:cNvPr id="8" name="TextBox 7">
+            <a:extLst>
+              <a:ext uri="{FF2B5EF4-FFF2-40B4-BE49-F238E27FC236}">
+                <a16:creationId xmlns:a16="http://schemas.microsoft.com/office/drawing/2014/main" id="{B36328CF-89B9-017F-51F3-040A9719FE98}"/>
+              </a:ext>
+            </a:extLst>
+          </p:cNvPr>
+          <p:cNvSpPr txBox="1"/>
+          <p:nvPr/>
+        </p:nvSpPr>
+        <p:spPr>
+          <a:xfrm>
+            <a:off x="6475544" y="119816"/>
+            <a:ext cx="3223260" cy="1323439"/>
+          </a:xfrm>
+          <a:prstGeom prst="rect">
+            <a:avLst/>
+          </a:prstGeom>
+          <a:noFill/>
+        </p:spPr>
+        <p:txBody>
+          <a:bodyPr wrap="square">
+            <a:spAutoFit/>
+          </a:bodyPr>
+          <a:lstStyle/>
+          <a:p>
+            <a:r>
+              <a:rPr lang="en-US" sz="8000" b="1" dirty="0">
+                <a:latin typeface="Times New Roman" panose="02020603050405020304" pitchFamily="18" charset="0"/>
+                <a:cs typeface="Times New Roman" panose="02020603050405020304" pitchFamily="18" charset="0"/>
+              </a:rPr>
+              <a:t>Step 5:</a:t>
+            </a:r>
+            <a:endParaRPr lang="en-US" sz="1400" dirty="0"/>
+          </a:p>
+        </p:txBody>
+      </p:sp>
+      <p:sp>
+        <p:nvSpPr>
+          <p:cNvPr id="9" name="TextBox 8">
+            <a:extLst>
+              <a:ext uri="{FF2B5EF4-FFF2-40B4-BE49-F238E27FC236}">
+                <a16:creationId xmlns:a16="http://schemas.microsoft.com/office/drawing/2014/main" id="{290DFA55-1975-7D67-D439-2F9ECD0CDA02}"/>
+              </a:ext>
+            </a:extLst>
+          </p:cNvPr>
+          <p:cNvSpPr txBox="1"/>
+          <p:nvPr/>
+        </p:nvSpPr>
+        <p:spPr>
+          <a:xfrm>
+            <a:off x="6475544" y="1537522"/>
+            <a:ext cx="5817622" cy="1384995"/>
+          </a:xfrm>
+          <a:prstGeom prst="rect">
+            <a:avLst/>
+          </a:prstGeom>
+          <a:noFill/>
+        </p:spPr>
+        <p:txBody>
+          <a:bodyPr wrap="square">
+            <a:spAutoFit/>
+          </a:bodyPr>
+          <a:lstStyle/>
+          <a:p>
+            <a:r>
+              <a:rPr lang="en-US" sz="2800" b="1" dirty="0">
+                <a:latin typeface="Times New Roman" panose="02020603050405020304" pitchFamily="18" charset="0"/>
+                <a:cs typeface="Times New Roman" panose="02020603050405020304" pitchFamily="18" charset="0"/>
+              </a:rPr>
+              <a:t>Recombine and assign overall rank</a:t>
+            </a:r>
+          </a:p>
+          <a:p>
+            <a:r>
+              <a:rPr lang="en-US" sz="2800" b="1" dirty="0">
+                <a:latin typeface="Times New Roman" panose="02020603050405020304" pitchFamily="18" charset="0"/>
+                <a:cs typeface="Times New Roman" panose="02020603050405020304" pitchFamily="18" charset="0"/>
+                <a:sym typeface="Wingdings" panose="05000000000000000000" pitchFamily="2" charset="2"/>
+              </a:rPr>
+              <a:t> The “overall rank” is your rank 	for the entire competition.</a:t>
+            </a:r>
+            <a:endParaRPr lang="en-US" sz="2800" dirty="0"/>
+          </a:p>
+        </p:txBody>
+      </p:sp>
+      <p:pic>
+        <p:nvPicPr>
+          <p:cNvPr id="4" name="Picture 3">
+            <a:extLst>
+              <a:ext uri="{FF2B5EF4-FFF2-40B4-BE49-F238E27FC236}">
+                <a16:creationId xmlns:a16="http://schemas.microsoft.com/office/drawing/2014/main" id="{8F987DC3-01C4-989D-CC67-B031B65DD784}"/>
+              </a:ext>
+            </a:extLst>
+          </p:cNvPr>
+          <p:cNvPicPr>
+            <a:picLocks noChangeAspect="1"/>
+          </p:cNvPicPr>
+          <p:nvPr/>
+        </p:nvPicPr>
+        <p:blipFill>
+          <a:blip r:embed="rId3"/>
+          <a:stretch>
+            <a:fillRect/>
+          </a:stretch>
+        </p:blipFill>
+        <p:spPr>
+          <a:xfrm>
+            <a:off x="213283" y="600477"/>
+            <a:ext cx="6202353" cy="6015159"/>
+          </a:xfrm>
+          <a:prstGeom prst="rect">
+            <a:avLst/>
+          </a:prstGeom>
+        </p:spPr>
+      </p:pic>
+    </p:spTree>
+    <p:extLst>
+      <p:ext uri="{BB962C8B-B14F-4D97-AF65-F5344CB8AC3E}">
+        <p14:creationId xmlns:p14="http://schemas.microsoft.com/office/powerpoint/2010/main" val="810067197"/>
+      </p:ext>
+    </p:extLst>
+  </p:cSld>
+  <p:clrMapOvr>
+    <a:masterClrMapping/>
+  </p:clrMapOvr>
+</p:sld>
+</file>
+
+<file path=ppt/slides/slide8.xml><?xml version="1.0" encoding="utf-8"?>
+<p:sld xmlns:a="http://schemas.openxmlformats.org/drawingml/2006/main" xmlns:r="http://schemas.openxmlformats.org/officeDocument/2006/relationships" xmlns:p="http://schemas.openxmlformats.org/presentationml/2006/main">
+  <p:cSld>
+    <p:spTree>
+      <p:nvGrpSpPr>
+        <p:cNvPr id="1" name=""/>
+        <p:cNvGrpSpPr/>
+        <p:nvPr/>
+      </p:nvGrpSpPr>
+      <p:grpSpPr>
+        <a:xfrm>
+          <a:off x="0" y="0"/>
+          <a:ext cx="0" cy="0"/>
+          <a:chOff x="0" y="0"/>
+          <a:chExt cx="0" cy="0"/>
+        </a:xfrm>
+      </p:grpSpPr>
+      <p:sp>
+        <p:nvSpPr>
+          <p:cNvPr id="8" name="TextBox 7">
+            <a:extLst>
+              <a:ext uri="{FF2B5EF4-FFF2-40B4-BE49-F238E27FC236}">
+                <a16:creationId xmlns:a16="http://schemas.microsoft.com/office/drawing/2014/main" id="{B36328CF-89B9-017F-51F3-040A9719FE98}"/>
+              </a:ext>
+            </a:extLst>
+          </p:cNvPr>
+          <p:cNvSpPr txBox="1"/>
+          <p:nvPr/>
+        </p:nvSpPr>
+        <p:spPr>
+          <a:xfrm>
+            <a:off x="1" y="0"/>
+            <a:ext cx="12192000" cy="1015663"/>
+          </a:xfrm>
+          <a:prstGeom prst="rect">
+            <a:avLst/>
+          </a:prstGeom>
+          <a:noFill/>
+        </p:spPr>
+        <p:txBody>
+          <a:bodyPr wrap="square">
+            <a:spAutoFit/>
+          </a:bodyPr>
+          <a:lstStyle/>
+          <a:p>
+            <a:pPr algn="ctr"/>
+            <a:r>
+              <a:rPr lang="en-US" sz="6000" b="1" dirty="0">
+                <a:latin typeface="Times New Roman" panose="02020603050405020304" pitchFamily="18" charset="0"/>
+                <a:cs typeface="Times New Roman" panose="02020603050405020304" pitchFamily="18" charset="0"/>
+              </a:rPr>
+              <a:t>Useful Properties of this system:</a:t>
+            </a:r>
+            <a:endParaRPr lang="en-US" sz="1050" dirty="0"/>
+          </a:p>
+        </p:txBody>
+      </p:sp>
+      <p:sp>
+        <p:nvSpPr>
+          <p:cNvPr id="9" name="TextBox 8">
+            <a:extLst>
+              <a:ext uri="{FF2B5EF4-FFF2-40B4-BE49-F238E27FC236}">
+                <a16:creationId xmlns:a16="http://schemas.microsoft.com/office/drawing/2014/main" id="{290DFA55-1975-7D67-D439-2F9ECD0CDA02}"/>
+              </a:ext>
+            </a:extLst>
+          </p:cNvPr>
+          <p:cNvSpPr txBox="1"/>
+          <p:nvPr/>
+        </p:nvSpPr>
+        <p:spPr>
+          <a:xfrm>
+            <a:off x="341746" y="1509813"/>
+            <a:ext cx="11249890" cy="2677656"/>
+          </a:xfrm>
+          <a:prstGeom prst="rect">
+            <a:avLst/>
+          </a:prstGeom>
+          <a:noFill/>
+        </p:spPr>
+        <p:txBody>
+          <a:bodyPr wrap="square">
+            <a:spAutoFit/>
+          </a:bodyPr>
+          <a:lstStyle/>
+          <a:p>
+            <a:pPr marL="457200" indent="-457200">
+              <a:buFont typeface="Arial" panose="020B0604020202020204" pitchFamily="34" charset="0"/>
+              <a:buChar char="•"/>
+            </a:pPr>
+            <a:r>
+              <a:rPr lang="en-US" sz="2800" b="1" dirty="0">
+                <a:latin typeface="Times New Roman" panose="02020603050405020304" pitchFamily="18" charset="0"/>
+                <a:cs typeface="Times New Roman" panose="02020603050405020304" pitchFamily="18" charset="0"/>
+              </a:rPr>
+              <a:t>Traders are </a:t>
+            </a:r>
+            <a:r>
+              <a:rPr lang="en-US" sz="2800" b="1" dirty="0">
+                <a:solidFill>
+                  <a:schemeClr val="accent6"/>
+                </a:solidFill>
+                <a:latin typeface="Times New Roman" panose="02020603050405020304" pitchFamily="18" charset="0"/>
+                <a:cs typeface="Times New Roman" panose="02020603050405020304" pitchFamily="18" charset="0"/>
+              </a:rPr>
+              <a:t>rewarded</a:t>
+            </a:r>
+            <a:r>
+              <a:rPr lang="en-US" sz="2800" b="1" dirty="0">
+                <a:latin typeface="Times New Roman" panose="02020603050405020304" pitchFamily="18" charset="0"/>
+                <a:cs typeface="Times New Roman" panose="02020603050405020304" pitchFamily="18" charset="0"/>
+              </a:rPr>
+              <a:t> for returns, but </a:t>
+            </a:r>
+            <a:r>
+              <a:rPr lang="en-US" sz="2800" b="1" dirty="0">
+                <a:solidFill>
+                  <a:srgbClr val="C00000"/>
+                </a:solidFill>
+                <a:latin typeface="Times New Roman" panose="02020603050405020304" pitchFamily="18" charset="0"/>
+                <a:cs typeface="Times New Roman" panose="02020603050405020304" pitchFamily="18" charset="0"/>
+              </a:rPr>
+              <a:t>penalized</a:t>
+            </a:r>
+            <a:r>
+              <a:rPr lang="en-US" sz="2800" b="1" dirty="0">
+                <a:latin typeface="Times New Roman" panose="02020603050405020304" pitchFamily="18" charset="0"/>
+                <a:cs typeface="Times New Roman" panose="02020603050405020304" pitchFamily="18" charset="0"/>
+              </a:rPr>
+              <a:t> for volatility</a:t>
+            </a:r>
+          </a:p>
+          <a:p>
+            <a:pPr marL="457200" indent="-457200">
+              <a:buFont typeface="Arial" panose="020B0604020202020204" pitchFamily="34" charset="0"/>
+              <a:buChar char="•"/>
+            </a:pPr>
+            <a:r>
+              <a:rPr lang="en-US" sz="2800" b="1" dirty="0">
+                <a:latin typeface="Times New Roman" panose="02020603050405020304" pitchFamily="18" charset="0"/>
+                <a:cs typeface="Times New Roman" panose="02020603050405020304" pitchFamily="18" charset="0"/>
+              </a:rPr>
+              <a:t>Cash prizes are only awarded to the top half of the top bracket</a:t>
+            </a:r>
+          </a:p>
+          <a:p>
+            <a:pPr marL="914400" lvl="1" indent="-457200">
+              <a:buFont typeface="Arial" panose="020B0604020202020204" pitchFamily="34" charset="0"/>
+              <a:buChar char="•"/>
+            </a:pPr>
+            <a:r>
+              <a:rPr lang="en-US" sz="2800" dirty="0">
+                <a:latin typeface="Times New Roman" panose="02020603050405020304" pitchFamily="18" charset="0"/>
+                <a:cs typeface="Times New Roman" panose="02020603050405020304" pitchFamily="18" charset="0"/>
+              </a:rPr>
+              <a:t>To get into the top bracket, you need a high return</a:t>
+            </a:r>
+          </a:p>
+          <a:p>
+            <a:pPr marL="914400" lvl="1" indent="-457200">
+              <a:buFont typeface="Arial" panose="020B0604020202020204" pitchFamily="34" charset="0"/>
+              <a:buChar char="•"/>
+            </a:pPr>
+            <a:r>
+              <a:rPr lang="en-US" sz="2800" dirty="0">
+                <a:latin typeface="Times New Roman" panose="02020603050405020304" pitchFamily="18" charset="0"/>
+                <a:cs typeface="Times New Roman" panose="02020603050405020304" pitchFamily="18" charset="0"/>
+              </a:rPr>
+              <a:t>But to place highly in the top bracket, you need a low vol!</a:t>
+            </a:r>
+          </a:p>
+          <a:p>
+            <a:pPr marL="457200" indent="-457200">
+              <a:buFont typeface="Arial" panose="020B0604020202020204" pitchFamily="34" charset="0"/>
+              <a:buChar char="•"/>
+            </a:pPr>
+            <a:r>
+              <a:rPr lang="en-US" sz="2800" b="1" dirty="0">
+                <a:latin typeface="Times New Roman" panose="02020603050405020304" pitchFamily="18" charset="0"/>
+                <a:cs typeface="Times New Roman" panose="02020603050405020304" pitchFamily="18" charset="0"/>
+              </a:rPr>
+              <a:t>Bracket system keeps traders competing</a:t>
+            </a:r>
+          </a:p>
+          <a:p>
+            <a:pPr marL="914400" lvl="1" indent="-457200">
+              <a:buFont typeface="Arial" panose="020B0604020202020204" pitchFamily="34" charset="0"/>
+              <a:buChar char="•"/>
+            </a:pPr>
+            <a:r>
+              <a:rPr lang="en-US" sz="2800" dirty="0">
+                <a:latin typeface="Times New Roman" panose="02020603050405020304" pitchFamily="18" charset="0"/>
+                <a:cs typeface="Times New Roman" panose="02020603050405020304" pitchFamily="18" charset="0"/>
+              </a:rPr>
+              <a:t>Even if you can’t win overall, you can chase top spots in your bracket</a:t>
+            </a:r>
+            <a:endParaRPr lang="en-US" sz="2800" dirty="0"/>
+          </a:p>
+        </p:txBody>
+      </p:sp>
+    </p:spTree>
+    <p:extLst>
+      <p:ext uri="{BB962C8B-B14F-4D97-AF65-F5344CB8AC3E}">
+        <p14:creationId xmlns:p14="http://schemas.microsoft.com/office/powerpoint/2010/main" val="2013614912"/>
       </p:ext>
     </p:extLst>
   </p:cSld>
@@ -3971,4 +6578,299 @@
     </a:ext>
   </a:extLst>
 </a:theme>
+</file>
+
+<file path=ppt/theme/theme2.xml><?xml version="1.0" encoding="utf-8"?>
+<a:theme xmlns:a="http://schemas.openxmlformats.org/drawingml/2006/main" name="Office Theme">
+  <a:themeElements>
+    <a:clrScheme name="Office">
+      <a:dk1>
+        <a:sysClr val="windowText" lastClr="000000"/>
+      </a:dk1>
+      <a:lt1>
+        <a:sysClr val="window" lastClr="FFFFFF"/>
+      </a:lt1>
+      <a:dk2>
+        <a:srgbClr val="44546A"/>
+      </a:dk2>
+      <a:lt2>
+        <a:srgbClr val="E7E6E6"/>
+      </a:lt2>
+      <a:accent1>
+        <a:srgbClr val="4472C4"/>
+      </a:accent1>
+      <a:accent2>
+        <a:srgbClr val="ED7D31"/>
+      </a:accent2>
+      <a:accent3>
+        <a:srgbClr val="A5A5A5"/>
+      </a:accent3>
+      <a:accent4>
+        <a:srgbClr val="FFC000"/>
+      </a:accent4>
+      <a:accent5>
+        <a:srgbClr val="5B9BD5"/>
+      </a:accent5>
+      <a:accent6>
+        <a:srgbClr val="70AD47"/>
+      </a:accent6>
+      <a:hlink>
+        <a:srgbClr val="0563C1"/>
+      </a:hlink>
+      <a:folHlink>
+        <a:srgbClr val="954F72"/>
+      </a:folHlink>
+    </a:clrScheme>
+    <a:fontScheme name="Office">
+      <a:majorFont>
+        <a:latin typeface="Calibri Light" panose="020F0302020204030204"/>
+        <a:ea typeface=""/>
+        <a:cs typeface=""/>
+        <a:font script="Jpan" typeface="游ゴシック Light"/>
+        <a:font script="Hang" typeface="맑은 고딕"/>
+        <a:font script="Hans" typeface="等线 Light"/>
+        <a:font script="Hant" typeface="新細明體"/>
+        <a:font script="Arab" typeface="Times New Roman"/>
+        <a:font script="Hebr" typeface="Times New Roman"/>
+        <a:font script="Thai" typeface="Angsana New"/>
+        <a:font script="Ethi" typeface="Nyala"/>
+        <a:font script="Beng" typeface="Vrinda"/>
+        <a:font script="Gujr" typeface="Shruti"/>
+        <a:font script="Khmr" typeface="MoolBoran"/>
+        <a:font script="Knda" typeface="Tunga"/>
+        <a:font script="Guru" typeface="Raavi"/>
+        <a:font script="Cans" typeface="Euphemia"/>
+        <a:font script="Cher" typeface="Plantagenet Cherokee"/>
+        <a:font script="Yiii" typeface="Microsoft Yi Baiti"/>
+        <a:font script="Tibt" typeface="Microsoft Himalaya"/>
+        <a:font script="Thaa" typeface="MV Boli"/>
+        <a:font script="Deva" typeface="Mangal"/>
+        <a:font script="Telu" typeface="Gautami"/>
+        <a:font script="Taml" typeface="Latha"/>
+        <a:font script="Syrc" typeface="Estrangelo Edessa"/>
+        <a:font script="Orya" typeface="Kalinga"/>
+        <a:font script="Mlym" typeface="Kartika"/>
+        <a:font script="Laoo" typeface="DokChampa"/>
+        <a:font script="Sinh" typeface="Iskoola Pota"/>
+        <a:font script="Mong" typeface="Mongolian Baiti"/>
+        <a:font script="Viet" typeface="Times New Roman"/>
+        <a:font script="Uigh" typeface="Microsoft Uighur"/>
+        <a:font script="Geor" typeface="Sylfaen"/>
+        <a:font script="Armn" typeface="Arial"/>
+        <a:font script="Bugi" typeface="Leelawadee UI"/>
+        <a:font script="Bopo" typeface="Microsoft JhengHei"/>
+        <a:font script="Java" typeface="Javanese Text"/>
+        <a:font script="Lisu" typeface="Segoe UI"/>
+        <a:font script="Mymr" typeface="Myanmar Text"/>
+        <a:font script="Nkoo" typeface="Ebrima"/>
+        <a:font script="Olck" typeface="Nirmala UI"/>
+        <a:font script="Osma" typeface="Ebrima"/>
+        <a:font script="Phag" typeface="Phagspa"/>
+        <a:font script="Syrn" typeface="Estrangelo Edessa"/>
+        <a:font script="Syrj" typeface="Estrangelo Edessa"/>
+        <a:font script="Syre" typeface="Estrangelo Edessa"/>
+        <a:font script="Sora" typeface="Nirmala UI"/>
+        <a:font script="Tale" typeface="Microsoft Tai Le"/>
+        <a:font script="Talu" typeface="Microsoft New Tai Lue"/>
+        <a:font script="Tfng" typeface="Ebrima"/>
+      </a:majorFont>
+      <a:minorFont>
+        <a:latin typeface="Calibri" panose="020F0502020204030204"/>
+        <a:ea typeface=""/>
+        <a:cs typeface=""/>
+        <a:font script="Jpan" typeface="游ゴシック"/>
+        <a:font script="Hang" typeface="맑은 고딕"/>
+        <a:font script="Hans" typeface="等线"/>
+        <a:font script="Hant" typeface="新細明體"/>
+        <a:font script="Arab" typeface="Arial"/>
+        <a:font script="Hebr" typeface="Arial"/>
+        <a:font script="Thai" typeface="Cordia New"/>
+        <a:font script="Ethi" typeface="Nyala"/>
+        <a:font script="Beng" typeface="Vrinda"/>
+        <a:font script="Gujr" typeface="Shruti"/>
+        <a:font script="Khmr" typeface="DaunPenh"/>
+        <a:font script="Knda" typeface="Tunga"/>
+        <a:font script="Guru" typeface="Raavi"/>
+        <a:font script="Cans" typeface="Euphemia"/>
+        <a:font script="Cher" typeface="Plantagenet Cherokee"/>
+        <a:font script="Yiii" typeface="Microsoft Yi Baiti"/>
+        <a:font script="Tibt" typeface="Microsoft Himalaya"/>
+        <a:font script="Thaa" typeface="MV Boli"/>
+        <a:font script="Deva" typeface="Mangal"/>
+        <a:font script="Telu" typeface="Gautami"/>
+        <a:font script="Taml" typeface="Latha"/>
+        <a:font script="Syrc" typeface="Estrangelo Edessa"/>
+        <a:font script="Orya" typeface="Kalinga"/>
+        <a:font script="Mlym" typeface="Kartika"/>
+        <a:font script="Laoo" typeface="DokChampa"/>
+        <a:font script="Sinh" typeface="Iskoola Pota"/>
+        <a:font script="Mong" typeface="Mongolian Baiti"/>
+        <a:font script="Viet" typeface="Arial"/>
+        <a:font script="Uigh" typeface="Microsoft Uighur"/>
+        <a:font script="Geor" typeface="Sylfaen"/>
+        <a:font script="Armn" typeface="Arial"/>
+        <a:font script="Bugi" typeface="Leelawadee UI"/>
+        <a:font script="Bopo" typeface="Microsoft JhengHei"/>
+        <a:font script="Java" typeface="Javanese Text"/>
+        <a:font script="Lisu" typeface="Segoe UI"/>
+        <a:font script="Mymr" typeface="Myanmar Text"/>
+        <a:font script="Nkoo" typeface="Ebrima"/>
+        <a:font script="Olck" typeface="Nirmala UI"/>
+        <a:font script="Osma" typeface="Ebrima"/>
+        <a:font script="Phag" typeface="Phagspa"/>
+        <a:font script="Syrn" typeface="Estrangelo Edessa"/>
+        <a:font script="Syrj" typeface="Estrangelo Edessa"/>
+        <a:font script="Syre" typeface="Estrangelo Edessa"/>
+        <a:font script="Sora" typeface="Nirmala UI"/>
+        <a:font script="Tale" typeface="Microsoft Tai Le"/>
+        <a:font script="Talu" typeface="Microsoft New Tai Lue"/>
+        <a:font script="Tfng" typeface="Ebrima"/>
+      </a:minorFont>
+    </a:fontScheme>
+    <a:fmtScheme name="Office">
+      <a:fillStyleLst>
+        <a:solidFill>
+          <a:schemeClr val="phClr"/>
+        </a:solidFill>
+        <a:gradFill rotWithShape="1">
+          <a:gsLst>
+            <a:gs pos="0">
+              <a:schemeClr val="phClr">
+                <a:lumMod val="110000"/>
+                <a:satMod val="105000"/>
+                <a:tint val="67000"/>
+              </a:schemeClr>
+            </a:gs>
+            <a:gs pos="50000">
+              <a:schemeClr val="phClr">
+                <a:lumMod val="105000"/>
+                <a:satMod val="103000"/>
+                <a:tint val="73000"/>
+              </a:schemeClr>
+            </a:gs>
+            <a:gs pos="100000">
+              <a:schemeClr val="phClr">
+                <a:lumMod val="105000"/>
+                <a:satMod val="109000"/>
+                <a:tint val="81000"/>
+              </a:schemeClr>
+            </a:gs>
+          </a:gsLst>
+          <a:lin ang="5400000" scaled="0"/>
+        </a:gradFill>
+        <a:gradFill rotWithShape="1">
+          <a:gsLst>
+            <a:gs pos="0">
+              <a:schemeClr val="phClr">
+                <a:satMod val="103000"/>
+                <a:lumMod val="102000"/>
+                <a:tint val="94000"/>
+              </a:schemeClr>
+            </a:gs>
+            <a:gs pos="50000">
+              <a:schemeClr val="phClr">
+                <a:satMod val="110000"/>
+                <a:lumMod val="100000"/>
+                <a:shade val="100000"/>
+              </a:schemeClr>
+            </a:gs>
+            <a:gs pos="100000">
+              <a:schemeClr val="phClr">
+                <a:lumMod val="99000"/>
+                <a:satMod val="120000"/>
+                <a:shade val="78000"/>
+              </a:schemeClr>
+            </a:gs>
+          </a:gsLst>
+          <a:lin ang="5400000" scaled="0"/>
+        </a:gradFill>
+      </a:fillStyleLst>
+      <a:lnStyleLst>
+        <a:ln w="6350" cap="flat" cmpd="sng" algn="ctr">
+          <a:solidFill>
+            <a:schemeClr val="phClr"/>
+          </a:solidFill>
+          <a:prstDash val="solid"/>
+          <a:miter lim="800000"/>
+        </a:ln>
+        <a:ln w="12700" cap="flat" cmpd="sng" algn="ctr">
+          <a:solidFill>
+            <a:schemeClr val="phClr"/>
+          </a:solidFill>
+          <a:prstDash val="solid"/>
+          <a:miter lim="800000"/>
+        </a:ln>
+        <a:ln w="19050" cap="flat" cmpd="sng" algn="ctr">
+          <a:solidFill>
+            <a:schemeClr val="phClr"/>
+          </a:solidFill>
+          <a:prstDash val="solid"/>
+          <a:miter lim="800000"/>
+        </a:ln>
+      </a:lnStyleLst>
+      <a:effectStyleLst>
+        <a:effectStyle>
+          <a:effectLst/>
+        </a:effectStyle>
+        <a:effectStyle>
+          <a:effectLst/>
+        </a:effectStyle>
+        <a:effectStyle>
+          <a:effectLst>
+            <a:outerShdw blurRad="57150" dist="19050" dir="5400000" algn="ctr" rotWithShape="0">
+              <a:srgbClr val="000000">
+                <a:alpha val="63000"/>
+              </a:srgbClr>
+            </a:outerShdw>
+          </a:effectLst>
+        </a:effectStyle>
+      </a:effectStyleLst>
+      <a:bgFillStyleLst>
+        <a:solidFill>
+          <a:schemeClr val="phClr"/>
+        </a:solidFill>
+        <a:solidFill>
+          <a:schemeClr val="phClr">
+            <a:tint val="95000"/>
+            <a:satMod val="170000"/>
+          </a:schemeClr>
+        </a:solidFill>
+        <a:gradFill rotWithShape="1">
+          <a:gsLst>
+            <a:gs pos="0">
+              <a:schemeClr val="phClr">
+                <a:tint val="93000"/>
+                <a:satMod val="150000"/>
+                <a:shade val="98000"/>
+                <a:lumMod val="102000"/>
+              </a:schemeClr>
+            </a:gs>
+            <a:gs pos="50000">
+              <a:schemeClr val="phClr">
+                <a:tint val="98000"/>
+                <a:satMod val="130000"/>
+                <a:shade val="90000"/>
+                <a:lumMod val="103000"/>
+              </a:schemeClr>
+            </a:gs>
+            <a:gs pos="100000">
+              <a:schemeClr val="phClr">
+                <a:shade val="63000"/>
+                <a:satMod val="120000"/>
+              </a:schemeClr>
+            </a:gs>
+          </a:gsLst>
+          <a:lin ang="5400000" scaled="0"/>
+        </a:gradFill>
+      </a:bgFillStyleLst>
+    </a:fmtScheme>
+  </a:themeElements>
+  <a:objectDefaults/>
+  <a:extraClrSchemeLst/>
+  <a:extLst>
+    <a:ext uri="{05A4C25C-085E-4340-85A3-A5531E510DB2}">
+      <thm15:themeFamily xmlns:thm15="http://schemas.microsoft.com/office/thememl/2012/main" name="Office Theme" id="{62F939B6-93AF-4DB8-9C6B-D6C7DFDC589F}" vid="{4A3C46E8-61CC-4603-A589-7422A47A8E4A}"/>
+    </a:ext>
+  </a:extLst>
+</a:theme>
 </file>
</xml_diff>